<commit_message>
update: text and presentation changes
</commit_message>
<xml_diff>
--- a/results/presentation/Presentation.pptx
+++ b/results/presentation/Presentation.pptx
@@ -5,16 +5,17 @@
     <p:sldMasterId id="2147483659" r:id="rId1"/>
   </p:sldMasterIdLst>
   <p:notesMasterIdLst>
-    <p:notesMasterId r:id="rId9"/>
+    <p:notesMasterId r:id="rId10"/>
   </p:notesMasterIdLst>
   <p:sldIdLst>
     <p:sldId id="308" r:id="rId2"/>
-    <p:sldId id="305" r:id="rId3"/>
-    <p:sldId id="258" r:id="rId4"/>
-    <p:sldId id="299" r:id="rId5"/>
-    <p:sldId id="300" r:id="rId6"/>
-    <p:sldId id="313" r:id="rId7"/>
-    <p:sldId id="314" r:id="rId8"/>
+    <p:sldId id="315" r:id="rId3"/>
+    <p:sldId id="305" r:id="rId4"/>
+    <p:sldId id="258" r:id="rId5"/>
+    <p:sldId id="299" r:id="rId6"/>
+    <p:sldId id="300" r:id="rId7"/>
+    <p:sldId id="313" r:id="rId8"/>
+    <p:sldId id="314" r:id="rId9"/>
   </p:sldIdLst>
   <p:sldSz cx="24742775" cy="13716000"/>
   <p:notesSz cx="6858000" cy="9144000"/>
@@ -226,6 +227,7 @@
         <p14:section name="Раздел по умолчанию" id="{1CCCB284-FAD9-4ACF-BBE5-987686199942}">
           <p14:sldIdLst>
             <p14:sldId id="308"/>
+            <p14:sldId id="315"/>
             <p14:sldId id="305"/>
             <p14:sldId id="258"/>
             <p14:sldId id="299"/>
@@ -577,6 +579,122 @@
 </file>
 
 <file path=ppt/notesSlides/notesSlide1.xml><?xml version="1.0" encoding="utf-8"?>
+<p:notes xmlns:a="http://schemas.openxmlformats.org/drawingml/2006/main" xmlns:r="http://schemas.openxmlformats.org/officeDocument/2006/relationships" xmlns:p="http://schemas.openxmlformats.org/presentationml/2006/main" showMasterSp="0" showMasterPhAnim="0">
+  <p:cSld>
+    <p:spTree>
+      <p:nvGrpSpPr>
+        <p:cNvPr id="1" name="Shape 64"/>
+        <p:cNvGrpSpPr/>
+        <p:nvPr/>
+      </p:nvGrpSpPr>
+      <p:grpSpPr>
+        <a:xfrm>
+          <a:off x="0" y="0"/>
+          <a:ext cx="0" cy="0"/>
+          <a:chOff x="0" y="0"/>
+          <a:chExt cx="0" cy="0"/>
+        </a:xfrm>
+      </p:grpSpPr>
+      <p:sp>
+        <p:nvSpPr>
+          <p:cNvPr id="65" name="Shape 65"/>
+          <p:cNvSpPr>
+            <a:spLocks noGrp="1" noRot="1" noChangeAspect="1"/>
+          </p:cNvSpPr>
+          <p:nvPr>
+            <p:ph type="sldImg" idx="2"/>
+          </p:nvPr>
+        </p:nvSpPr>
+        <p:spPr>
+          <a:xfrm>
+            <a:off x="336550" y="685800"/>
+            <a:ext cx="6184900" cy="3429000"/>
+          </a:xfrm>
+          <a:custGeom>
+            <a:avLst/>
+            <a:gdLst/>
+            <a:ahLst/>
+            <a:cxnLst/>
+            <a:rect l="0" t="0" r="0" b="0"/>
+            <a:pathLst>
+              <a:path w="120000" h="120000" extrusionOk="0">
+                <a:moveTo>
+                  <a:pt x="0" y="0"/>
+                </a:moveTo>
+                <a:lnTo>
+                  <a:pt x="120000" y="0"/>
+                </a:lnTo>
+                <a:lnTo>
+                  <a:pt x="120000" y="120000"/>
+                </a:lnTo>
+                <a:lnTo>
+                  <a:pt x="0" y="120000"/>
+                </a:lnTo>
+                <a:close/>
+              </a:path>
+            </a:pathLst>
+          </a:custGeom>
+          <a:noFill/>
+          <a:ln w="9525" cap="flat" cmpd="sng">
+            <a:solidFill>
+              <a:srgbClr val="000000"/>
+            </a:solidFill>
+            <a:prstDash val="solid"/>
+            <a:round/>
+            <a:headEnd type="none" w="med" len="med"/>
+            <a:tailEnd type="none" w="med" len="med"/>
+          </a:ln>
+        </p:spPr>
+      </p:sp>
+      <p:sp>
+        <p:nvSpPr>
+          <p:cNvPr id="66" name="Shape 66"/>
+          <p:cNvSpPr txBox="1">
+            <a:spLocks noGrp="1"/>
+          </p:cNvSpPr>
+          <p:nvPr>
+            <p:ph type="body" idx="1"/>
+          </p:nvPr>
+        </p:nvSpPr>
+        <p:spPr>
+          <a:xfrm>
+            <a:off x="685800" y="4343400"/>
+            <a:ext cx="5486399" cy="4114800"/>
+          </a:xfrm>
+          <a:prstGeom prst="rect">
+            <a:avLst/>
+          </a:prstGeom>
+        </p:spPr>
+        <p:txBody>
+          <a:bodyPr lIns="91425" tIns="91425" rIns="91425" bIns="91425" anchor="t" anchorCtr="0">
+            <a:noAutofit/>
+          </a:bodyPr>
+          <a:lstStyle/>
+          <a:p>
+            <a:pPr>
+              <a:spcBef>
+                <a:spcPts val="0"/>
+              </a:spcBef>
+              <a:buNone/>
+            </a:pPr>
+            <a:endParaRPr dirty="0"/>
+          </a:p>
+        </p:txBody>
+      </p:sp>
+    </p:spTree>
+    <p:extLst>
+      <p:ext uri="{BB962C8B-B14F-4D97-AF65-F5344CB8AC3E}">
+        <p14:creationId xmlns:p14="http://schemas.microsoft.com/office/powerpoint/2010/main" val="4004538071"/>
+      </p:ext>
+    </p:extLst>
+  </p:cSld>
+  <p:clrMapOvr>
+    <a:masterClrMapping/>
+  </p:clrMapOvr>
+</p:notes>
+</file>
+
+<file path=ppt/notesSlides/notesSlide2.xml><?xml version="1.0" encoding="utf-8"?>
 <p:notes xmlns:a="http://schemas.openxmlformats.org/drawingml/2006/main" xmlns:r="http://schemas.openxmlformats.org/officeDocument/2006/relationships" xmlns:p="http://schemas.openxmlformats.org/presentationml/2006/main" showMasterSp="0" showMasterPhAnim="0">
   <p:cSld>
     <p:spTree>
@@ -6928,6 +7046,1139 @@
   <p:cSld>
     <p:spTree>
       <p:nvGrpSpPr>
+        <p:cNvPr id="1" name="Shape 61"/>
+        <p:cNvGrpSpPr/>
+        <p:nvPr/>
+      </p:nvGrpSpPr>
+      <p:grpSpPr>
+        <a:xfrm>
+          <a:off x="0" y="0"/>
+          <a:ext cx="0" cy="0"/>
+          <a:chOff x="0" y="0"/>
+          <a:chExt cx="0" cy="0"/>
+        </a:xfrm>
+      </p:grpSpPr>
+      <p:sp>
+        <p:nvSpPr>
+          <p:cNvPr id="45" name="Заголовок 1"/>
+          <p:cNvSpPr>
+            <a:spLocks noGrp="1"/>
+          </p:cNvSpPr>
+          <p:nvPr>
+            <p:ph type="title"/>
+          </p:nvPr>
+        </p:nvSpPr>
+        <p:spPr>
+          <a:xfrm>
+            <a:off x="883251" y="560160"/>
+            <a:ext cx="23093252" cy="2952328"/>
+          </a:xfrm>
+        </p:spPr>
+        <p:txBody>
+          <a:bodyPr/>
+          <a:lstStyle/>
+          <a:p>
+            <a:r>
+              <a:rPr lang="ru" dirty="0"/>
+              <a:t>Актуальность и мотивация</a:t>
+            </a:r>
+            <a:br>
+              <a:rPr lang="ru" sz="2400" dirty="0"/>
+            </a:br>
+            <a:endParaRPr lang="ru-RU" dirty="0"/>
+          </a:p>
+        </p:txBody>
+      </p:sp>
+      <p:sp>
+        <p:nvSpPr>
+          <p:cNvPr id="27" name="Текст 2"/>
+          <p:cNvSpPr txBox="1">
+            <a:spLocks/>
+          </p:cNvSpPr>
+          <p:nvPr/>
+        </p:nvSpPr>
+        <p:spPr>
+          <a:xfrm>
+            <a:off x="-1191958" y="4119118"/>
+            <a:ext cx="7119574" cy="4594575"/>
+          </a:xfrm>
+          <a:prstGeom prst="rect">
+            <a:avLst/>
+          </a:prstGeom>
+          <a:noFill/>
+          <a:ln>
+            <a:noFill/>
+          </a:ln>
+        </p:spPr>
+        <p:txBody>
+          <a:bodyPr lIns="91425" tIns="91425" rIns="91425" bIns="91425" anchor="t" anchorCtr="0"/>
+          <a:lstStyle>
+            <a:defPPr marR="0" algn="l" rtl="0">
+              <a:lnSpc>
+                <a:spcPct val="100000"/>
+              </a:lnSpc>
+              <a:spcBef>
+                <a:spcPts val="0"/>
+              </a:spcBef>
+              <a:spcAft>
+                <a:spcPts val="0"/>
+              </a:spcAft>
+            </a:defPPr>
+            <a:lvl1pPr marR="0" algn="l" rtl="0">
+              <a:lnSpc>
+                <a:spcPct val="100000"/>
+              </a:lnSpc>
+              <a:spcBef>
+                <a:spcPts val="0"/>
+              </a:spcBef>
+              <a:spcAft>
+                <a:spcPts val="1600"/>
+              </a:spcAft>
+              <a:buClr>
+                <a:schemeClr val="dk2"/>
+              </a:buClr>
+              <a:buSzPct val="100000"/>
+              <a:buNone/>
+              <a:defRPr sz="3200" b="0" i="0" u="none" strike="noStrike" cap="none" spc="-5" baseline="0" dirty="0">
+                <a:solidFill>
+                  <a:schemeClr val="dk2"/>
+                </a:solidFill>
+                <a:latin typeface="+mn-lt"/>
+                <a:ea typeface="Arial"/>
+                <a:cs typeface="Arial"/>
+                <a:sym typeface="Arial"/>
+              </a:defRPr>
+            </a:lvl1pPr>
+            <a:lvl2pPr marR="0" algn="l" rtl="0">
+              <a:lnSpc>
+                <a:spcPct val="115000"/>
+              </a:lnSpc>
+              <a:spcBef>
+                <a:spcPts val="0"/>
+              </a:spcBef>
+              <a:spcAft>
+                <a:spcPts val="1600"/>
+              </a:spcAft>
+              <a:buClr>
+                <a:schemeClr val="dk2"/>
+              </a:buClr>
+              <a:buNone/>
+              <a:defRPr sz="3733" b="0" i="0" u="none" strike="noStrike" cap="none" baseline="0">
+                <a:solidFill>
+                  <a:schemeClr val="dk2"/>
+                </a:solidFill>
+                <a:latin typeface="Arial"/>
+                <a:ea typeface="Arial"/>
+                <a:cs typeface="Arial"/>
+                <a:sym typeface="Arial"/>
+              </a:defRPr>
+            </a:lvl2pPr>
+            <a:lvl3pPr marR="0" algn="l" rtl="0">
+              <a:lnSpc>
+                <a:spcPct val="115000"/>
+              </a:lnSpc>
+              <a:spcBef>
+                <a:spcPts val="0"/>
+              </a:spcBef>
+              <a:spcAft>
+                <a:spcPts val="1600"/>
+              </a:spcAft>
+              <a:buClr>
+                <a:schemeClr val="dk2"/>
+              </a:buClr>
+              <a:buNone/>
+              <a:defRPr sz="3733" b="0" i="0" u="none" strike="noStrike" cap="none" baseline="0">
+                <a:solidFill>
+                  <a:schemeClr val="dk2"/>
+                </a:solidFill>
+                <a:latin typeface="Arial"/>
+                <a:ea typeface="Arial"/>
+                <a:cs typeface="Arial"/>
+                <a:sym typeface="Arial"/>
+              </a:defRPr>
+            </a:lvl3pPr>
+            <a:lvl4pPr marR="0" algn="l" rtl="0">
+              <a:lnSpc>
+                <a:spcPct val="115000"/>
+              </a:lnSpc>
+              <a:spcBef>
+                <a:spcPts val="0"/>
+              </a:spcBef>
+              <a:spcAft>
+                <a:spcPts val="1600"/>
+              </a:spcAft>
+              <a:buClr>
+                <a:schemeClr val="dk2"/>
+              </a:buClr>
+              <a:buNone/>
+              <a:defRPr sz="3733" b="0" i="0" u="none" strike="noStrike" cap="none" baseline="0">
+                <a:solidFill>
+                  <a:schemeClr val="dk2"/>
+                </a:solidFill>
+                <a:latin typeface="Arial"/>
+                <a:ea typeface="Arial"/>
+                <a:cs typeface="Arial"/>
+                <a:sym typeface="Arial"/>
+              </a:defRPr>
+            </a:lvl4pPr>
+            <a:lvl5pPr marR="0" algn="l" rtl="0">
+              <a:lnSpc>
+                <a:spcPct val="115000"/>
+              </a:lnSpc>
+              <a:spcBef>
+                <a:spcPts val="0"/>
+              </a:spcBef>
+              <a:spcAft>
+                <a:spcPts val="1600"/>
+              </a:spcAft>
+              <a:buClr>
+                <a:schemeClr val="dk2"/>
+              </a:buClr>
+              <a:buNone/>
+              <a:defRPr sz="3733" b="0" i="0" u="none" strike="noStrike" cap="none" baseline="0">
+                <a:solidFill>
+                  <a:schemeClr val="dk2"/>
+                </a:solidFill>
+                <a:latin typeface="Arial"/>
+                <a:ea typeface="Arial"/>
+                <a:cs typeface="Arial"/>
+                <a:sym typeface="Arial"/>
+              </a:defRPr>
+            </a:lvl5pPr>
+            <a:lvl6pPr marR="0" algn="l" rtl="0">
+              <a:lnSpc>
+                <a:spcPct val="115000"/>
+              </a:lnSpc>
+              <a:spcBef>
+                <a:spcPts val="0"/>
+              </a:spcBef>
+              <a:spcAft>
+                <a:spcPts val="1600"/>
+              </a:spcAft>
+              <a:buClr>
+                <a:schemeClr val="dk2"/>
+              </a:buClr>
+              <a:buNone/>
+              <a:defRPr sz="3733" b="0" i="0" u="none" strike="noStrike" cap="none" baseline="0">
+                <a:solidFill>
+                  <a:schemeClr val="dk2"/>
+                </a:solidFill>
+                <a:latin typeface="Arial"/>
+                <a:ea typeface="Arial"/>
+                <a:cs typeface="Arial"/>
+                <a:sym typeface="Arial"/>
+              </a:defRPr>
+            </a:lvl6pPr>
+            <a:lvl7pPr marR="0" algn="l" rtl="0">
+              <a:lnSpc>
+                <a:spcPct val="115000"/>
+              </a:lnSpc>
+              <a:spcBef>
+                <a:spcPts val="0"/>
+              </a:spcBef>
+              <a:spcAft>
+                <a:spcPts val="1600"/>
+              </a:spcAft>
+              <a:buClr>
+                <a:schemeClr val="dk2"/>
+              </a:buClr>
+              <a:buNone/>
+              <a:defRPr sz="3733" b="0" i="0" u="none" strike="noStrike" cap="none" baseline="0">
+                <a:solidFill>
+                  <a:schemeClr val="dk2"/>
+                </a:solidFill>
+                <a:latin typeface="Arial"/>
+                <a:ea typeface="Arial"/>
+                <a:cs typeface="Arial"/>
+                <a:sym typeface="Arial"/>
+              </a:defRPr>
+            </a:lvl7pPr>
+            <a:lvl8pPr marR="0" algn="l" rtl="0">
+              <a:lnSpc>
+                <a:spcPct val="115000"/>
+              </a:lnSpc>
+              <a:spcBef>
+                <a:spcPts val="0"/>
+              </a:spcBef>
+              <a:spcAft>
+                <a:spcPts val="1600"/>
+              </a:spcAft>
+              <a:buClr>
+                <a:schemeClr val="dk2"/>
+              </a:buClr>
+              <a:buNone/>
+              <a:defRPr sz="3733" b="0" i="0" u="none" strike="noStrike" cap="none" baseline="0">
+                <a:solidFill>
+                  <a:schemeClr val="dk2"/>
+                </a:solidFill>
+                <a:latin typeface="Arial"/>
+                <a:ea typeface="Arial"/>
+                <a:cs typeface="Arial"/>
+                <a:sym typeface="Arial"/>
+              </a:defRPr>
+            </a:lvl8pPr>
+            <a:lvl9pPr marR="0" algn="l" rtl="0">
+              <a:lnSpc>
+                <a:spcPct val="115000"/>
+              </a:lnSpc>
+              <a:spcBef>
+                <a:spcPts val="0"/>
+              </a:spcBef>
+              <a:spcAft>
+                <a:spcPts val="1600"/>
+              </a:spcAft>
+              <a:buClr>
+                <a:schemeClr val="dk2"/>
+              </a:buClr>
+              <a:buNone/>
+              <a:defRPr sz="3733" b="0" i="0" u="none" strike="noStrike" cap="none" baseline="0">
+                <a:solidFill>
+                  <a:schemeClr val="dk2"/>
+                </a:solidFill>
+                <a:latin typeface="Arial"/>
+                <a:ea typeface="Arial"/>
+                <a:cs typeface="Arial"/>
+                <a:sym typeface="Arial"/>
+              </a:defRPr>
+            </a:lvl9pPr>
+          </a:lstStyle>
+          <a:p>
+            <a:endParaRPr lang="en-US" dirty="0">
+              <a:solidFill>
+                <a:schemeClr val="bg1">
+                  <a:lumMod val="85000"/>
+                </a:schemeClr>
+              </a:solidFill>
+              <a:latin typeface="Franklin Gothic Book" panose="020B0503020102020204" pitchFamily="34" charset="0"/>
+            </a:endParaRPr>
+          </a:p>
+          <a:p>
+            <a:endParaRPr lang="ru-RU" dirty="0">
+              <a:solidFill>
+                <a:schemeClr val="bg1">
+                  <a:lumMod val="85000"/>
+                </a:schemeClr>
+              </a:solidFill>
+            </a:endParaRPr>
+          </a:p>
+        </p:txBody>
+      </p:sp>
+      <p:sp>
+        <p:nvSpPr>
+          <p:cNvPr id="30" name="Текст 4"/>
+          <p:cNvSpPr txBox="1">
+            <a:spLocks/>
+          </p:cNvSpPr>
+          <p:nvPr/>
+        </p:nvSpPr>
+        <p:spPr>
+          <a:xfrm>
+            <a:off x="6939382" y="7578080"/>
+            <a:ext cx="7119574" cy="4594575"/>
+          </a:xfrm>
+          <a:prstGeom prst="rect">
+            <a:avLst/>
+          </a:prstGeom>
+          <a:noFill/>
+          <a:ln>
+            <a:noFill/>
+          </a:ln>
+        </p:spPr>
+        <p:txBody>
+          <a:bodyPr lIns="91425" tIns="91425" rIns="91425" bIns="91425" anchor="t" anchorCtr="0"/>
+          <a:lstStyle>
+            <a:defPPr marR="0" algn="l" rtl="0">
+              <a:lnSpc>
+                <a:spcPct val="100000"/>
+              </a:lnSpc>
+              <a:spcBef>
+                <a:spcPts val="0"/>
+              </a:spcBef>
+              <a:spcAft>
+                <a:spcPts val="0"/>
+              </a:spcAft>
+            </a:defPPr>
+            <a:lvl1pPr marR="0" algn="l" rtl="0">
+              <a:lnSpc>
+                <a:spcPct val="100000"/>
+              </a:lnSpc>
+              <a:spcBef>
+                <a:spcPts val="0"/>
+              </a:spcBef>
+              <a:spcAft>
+                <a:spcPts val="1600"/>
+              </a:spcAft>
+              <a:buClr>
+                <a:schemeClr val="dk2"/>
+              </a:buClr>
+              <a:buSzPct val="100000"/>
+              <a:buNone/>
+              <a:defRPr sz="3200" b="0" i="0" u="none" strike="noStrike" cap="none" spc="-5" baseline="0" dirty="0">
+                <a:solidFill>
+                  <a:schemeClr val="dk2"/>
+                </a:solidFill>
+                <a:latin typeface="+mn-lt"/>
+                <a:ea typeface="Arial"/>
+                <a:cs typeface="Arial"/>
+                <a:sym typeface="Arial"/>
+              </a:defRPr>
+            </a:lvl1pPr>
+            <a:lvl2pPr marR="0" algn="l" rtl="0">
+              <a:lnSpc>
+                <a:spcPct val="115000"/>
+              </a:lnSpc>
+              <a:spcBef>
+                <a:spcPts val="0"/>
+              </a:spcBef>
+              <a:spcAft>
+                <a:spcPts val="1600"/>
+              </a:spcAft>
+              <a:buClr>
+                <a:schemeClr val="dk2"/>
+              </a:buClr>
+              <a:buNone/>
+              <a:defRPr sz="3733" b="0" i="0" u="none" strike="noStrike" cap="none" baseline="0">
+                <a:solidFill>
+                  <a:schemeClr val="dk2"/>
+                </a:solidFill>
+                <a:latin typeface="Arial"/>
+                <a:ea typeface="Arial"/>
+                <a:cs typeface="Arial"/>
+                <a:sym typeface="Arial"/>
+              </a:defRPr>
+            </a:lvl2pPr>
+            <a:lvl3pPr marR="0" algn="l" rtl="0">
+              <a:lnSpc>
+                <a:spcPct val="115000"/>
+              </a:lnSpc>
+              <a:spcBef>
+                <a:spcPts val="0"/>
+              </a:spcBef>
+              <a:spcAft>
+                <a:spcPts val="1600"/>
+              </a:spcAft>
+              <a:buClr>
+                <a:schemeClr val="dk2"/>
+              </a:buClr>
+              <a:buNone/>
+              <a:defRPr sz="3733" b="0" i="0" u="none" strike="noStrike" cap="none" baseline="0">
+                <a:solidFill>
+                  <a:schemeClr val="dk2"/>
+                </a:solidFill>
+                <a:latin typeface="Arial"/>
+                <a:ea typeface="Arial"/>
+                <a:cs typeface="Arial"/>
+                <a:sym typeface="Arial"/>
+              </a:defRPr>
+            </a:lvl3pPr>
+            <a:lvl4pPr marR="0" algn="l" rtl="0">
+              <a:lnSpc>
+                <a:spcPct val="115000"/>
+              </a:lnSpc>
+              <a:spcBef>
+                <a:spcPts val="0"/>
+              </a:spcBef>
+              <a:spcAft>
+                <a:spcPts val="1600"/>
+              </a:spcAft>
+              <a:buClr>
+                <a:schemeClr val="dk2"/>
+              </a:buClr>
+              <a:buNone/>
+              <a:defRPr sz="3733" b="0" i="0" u="none" strike="noStrike" cap="none" baseline="0">
+                <a:solidFill>
+                  <a:schemeClr val="dk2"/>
+                </a:solidFill>
+                <a:latin typeface="Arial"/>
+                <a:ea typeface="Arial"/>
+                <a:cs typeface="Arial"/>
+                <a:sym typeface="Arial"/>
+              </a:defRPr>
+            </a:lvl4pPr>
+            <a:lvl5pPr marR="0" algn="l" rtl="0">
+              <a:lnSpc>
+                <a:spcPct val="115000"/>
+              </a:lnSpc>
+              <a:spcBef>
+                <a:spcPts val="0"/>
+              </a:spcBef>
+              <a:spcAft>
+                <a:spcPts val="1600"/>
+              </a:spcAft>
+              <a:buClr>
+                <a:schemeClr val="dk2"/>
+              </a:buClr>
+              <a:buNone/>
+              <a:defRPr sz="3733" b="0" i="0" u="none" strike="noStrike" cap="none" baseline="0">
+                <a:solidFill>
+                  <a:schemeClr val="dk2"/>
+                </a:solidFill>
+                <a:latin typeface="Arial"/>
+                <a:ea typeface="Arial"/>
+                <a:cs typeface="Arial"/>
+                <a:sym typeface="Arial"/>
+              </a:defRPr>
+            </a:lvl5pPr>
+            <a:lvl6pPr marR="0" algn="l" rtl="0">
+              <a:lnSpc>
+                <a:spcPct val="115000"/>
+              </a:lnSpc>
+              <a:spcBef>
+                <a:spcPts val="0"/>
+              </a:spcBef>
+              <a:spcAft>
+                <a:spcPts val="1600"/>
+              </a:spcAft>
+              <a:buClr>
+                <a:schemeClr val="dk2"/>
+              </a:buClr>
+              <a:buNone/>
+              <a:defRPr sz="3733" b="0" i="0" u="none" strike="noStrike" cap="none" baseline="0">
+                <a:solidFill>
+                  <a:schemeClr val="dk2"/>
+                </a:solidFill>
+                <a:latin typeface="Arial"/>
+                <a:ea typeface="Arial"/>
+                <a:cs typeface="Arial"/>
+                <a:sym typeface="Arial"/>
+              </a:defRPr>
+            </a:lvl6pPr>
+            <a:lvl7pPr marR="0" algn="l" rtl="0">
+              <a:lnSpc>
+                <a:spcPct val="115000"/>
+              </a:lnSpc>
+              <a:spcBef>
+                <a:spcPts val="0"/>
+              </a:spcBef>
+              <a:spcAft>
+                <a:spcPts val="1600"/>
+              </a:spcAft>
+              <a:buClr>
+                <a:schemeClr val="dk2"/>
+              </a:buClr>
+              <a:buNone/>
+              <a:defRPr sz="3733" b="0" i="0" u="none" strike="noStrike" cap="none" baseline="0">
+                <a:solidFill>
+                  <a:schemeClr val="dk2"/>
+                </a:solidFill>
+                <a:latin typeface="Arial"/>
+                <a:ea typeface="Arial"/>
+                <a:cs typeface="Arial"/>
+                <a:sym typeface="Arial"/>
+              </a:defRPr>
+            </a:lvl7pPr>
+            <a:lvl8pPr marR="0" algn="l" rtl="0">
+              <a:lnSpc>
+                <a:spcPct val="115000"/>
+              </a:lnSpc>
+              <a:spcBef>
+                <a:spcPts val="0"/>
+              </a:spcBef>
+              <a:spcAft>
+                <a:spcPts val="1600"/>
+              </a:spcAft>
+              <a:buClr>
+                <a:schemeClr val="dk2"/>
+              </a:buClr>
+              <a:buNone/>
+              <a:defRPr sz="3733" b="0" i="0" u="none" strike="noStrike" cap="none" baseline="0">
+                <a:solidFill>
+                  <a:schemeClr val="dk2"/>
+                </a:solidFill>
+                <a:latin typeface="Arial"/>
+                <a:ea typeface="Arial"/>
+                <a:cs typeface="Arial"/>
+                <a:sym typeface="Arial"/>
+              </a:defRPr>
+            </a:lvl8pPr>
+            <a:lvl9pPr marR="0" algn="l" rtl="0">
+              <a:lnSpc>
+                <a:spcPct val="115000"/>
+              </a:lnSpc>
+              <a:spcBef>
+                <a:spcPts val="0"/>
+              </a:spcBef>
+              <a:spcAft>
+                <a:spcPts val="1600"/>
+              </a:spcAft>
+              <a:buClr>
+                <a:schemeClr val="dk2"/>
+              </a:buClr>
+              <a:buNone/>
+              <a:defRPr sz="3733" b="0" i="0" u="none" strike="noStrike" cap="none" baseline="0">
+                <a:solidFill>
+                  <a:schemeClr val="dk2"/>
+                </a:solidFill>
+                <a:latin typeface="Arial"/>
+                <a:ea typeface="Arial"/>
+                <a:cs typeface="Arial"/>
+                <a:sym typeface="Arial"/>
+              </a:defRPr>
+            </a:lvl9pPr>
+          </a:lstStyle>
+          <a:p>
+            <a:pPr>
+              <a:spcAft>
+                <a:spcPts val="800"/>
+              </a:spcAft>
+              <a:buClrTx/>
+              <a:buSzTx/>
+            </a:pPr>
+            <a:endParaRPr lang="en-US" dirty="0">
+              <a:solidFill>
+                <a:schemeClr val="bg1">
+                  <a:lumMod val="85000"/>
+                </a:schemeClr>
+              </a:solidFill>
+              <a:latin typeface="Franklin Gothic Book" panose="020B0503020102020204" pitchFamily="34" charset="0"/>
+            </a:endParaRPr>
+          </a:p>
+        </p:txBody>
+      </p:sp>
+      <p:sp>
+        <p:nvSpPr>
+          <p:cNvPr id="42" name="Текст 5"/>
+          <p:cNvSpPr txBox="1">
+            <a:spLocks/>
+          </p:cNvSpPr>
+          <p:nvPr/>
+        </p:nvSpPr>
+        <p:spPr>
+          <a:xfrm>
+            <a:off x="16224001" y="8384105"/>
+            <a:ext cx="7119574" cy="4594575"/>
+          </a:xfrm>
+          <a:prstGeom prst="rect">
+            <a:avLst/>
+          </a:prstGeom>
+          <a:noFill/>
+          <a:ln>
+            <a:noFill/>
+          </a:ln>
+        </p:spPr>
+        <p:txBody>
+          <a:bodyPr lIns="91425" tIns="91425" rIns="91425" bIns="91425" anchor="t" anchorCtr="0"/>
+          <a:lstStyle>
+            <a:defPPr marR="0" algn="l" rtl="0">
+              <a:lnSpc>
+                <a:spcPct val="100000"/>
+              </a:lnSpc>
+              <a:spcBef>
+                <a:spcPts val="0"/>
+              </a:spcBef>
+              <a:spcAft>
+                <a:spcPts val="0"/>
+              </a:spcAft>
+            </a:defPPr>
+            <a:lvl1pPr marR="0" algn="l" rtl="0">
+              <a:lnSpc>
+                <a:spcPct val="100000"/>
+              </a:lnSpc>
+              <a:spcBef>
+                <a:spcPts val="0"/>
+              </a:spcBef>
+              <a:spcAft>
+                <a:spcPts val="1600"/>
+              </a:spcAft>
+              <a:buClr>
+                <a:schemeClr val="dk2"/>
+              </a:buClr>
+              <a:buSzPct val="100000"/>
+              <a:buNone/>
+              <a:defRPr sz="3200" b="0" i="0" u="none" strike="noStrike" cap="none" spc="-5" baseline="0" dirty="0">
+                <a:solidFill>
+                  <a:schemeClr val="dk2"/>
+                </a:solidFill>
+                <a:latin typeface="+mn-lt"/>
+                <a:ea typeface="Arial"/>
+                <a:cs typeface="Arial"/>
+                <a:sym typeface="Arial"/>
+              </a:defRPr>
+            </a:lvl1pPr>
+            <a:lvl2pPr marR="0" algn="l" rtl="0">
+              <a:lnSpc>
+                <a:spcPct val="115000"/>
+              </a:lnSpc>
+              <a:spcBef>
+                <a:spcPts val="0"/>
+              </a:spcBef>
+              <a:spcAft>
+                <a:spcPts val="1600"/>
+              </a:spcAft>
+              <a:buClr>
+                <a:schemeClr val="dk2"/>
+              </a:buClr>
+              <a:buNone/>
+              <a:defRPr sz="3733" b="0" i="0" u="none" strike="noStrike" cap="none" baseline="0">
+                <a:solidFill>
+                  <a:schemeClr val="dk2"/>
+                </a:solidFill>
+                <a:latin typeface="Arial"/>
+                <a:ea typeface="Arial"/>
+                <a:cs typeface="Arial"/>
+                <a:sym typeface="Arial"/>
+              </a:defRPr>
+            </a:lvl2pPr>
+            <a:lvl3pPr marR="0" algn="l" rtl="0">
+              <a:lnSpc>
+                <a:spcPct val="115000"/>
+              </a:lnSpc>
+              <a:spcBef>
+                <a:spcPts val="0"/>
+              </a:spcBef>
+              <a:spcAft>
+                <a:spcPts val="1600"/>
+              </a:spcAft>
+              <a:buClr>
+                <a:schemeClr val="dk2"/>
+              </a:buClr>
+              <a:buNone/>
+              <a:defRPr sz="3733" b="0" i="0" u="none" strike="noStrike" cap="none" baseline="0">
+                <a:solidFill>
+                  <a:schemeClr val="dk2"/>
+                </a:solidFill>
+                <a:latin typeface="Arial"/>
+                <a:ea typeface="Arial"/>
+                <a:cs typeface="Arial"/>
+                <a:sym typeface="Arial"/>
+              </a:defRPr>
+            </a:lvl3pPr>
+            <a:lvl4pPr marR="0" algn="l" rtl="0">
+              <a:lnSpc>
+                <a:spcPct val="115000"/>
+              </a:lnSpc>
+              <a:spcBef>
+                <a:spcPts val="0"/>
+              </a:spcBef>
+              <a:spcAft>
+                <a:spcPts val="1600"/>
+              </a:spcAft>
+              <a:buClr>
+                <a:schemeClr val="dk2"/>
+              </a:buClr>
+              <a:buNone/>
+              <a:defRPr sz="3733" b="0" i="0" u="none" strike="noStrike" cap="none" baseline="0">
+                <a:solidFill>
+                  <a:schemeClr val="dk2"/>
+                </a:solidFill>
+                <a:latin typeface="Arial"/>
+                <a:ea typeface="Arial"/>
+                <a:cs typeface="Arial"/>
+                <a:sym typeface="Arial"/>
+              </a:defRPr>
+            </a:lvl4pPr>
+            <a:lvl5pPr marR="0" algn="l" rtl="0">
+              <a:lnSpc>
+                <a:spcPct val="115000"/>
+              </a:lnSpc>
+              <a:spcBef>
+                <a:spcPts val="0"/>
+              </a:spcBef>
+              <a:spcAft>
+                <a:spcPts val="1600"/>
+              </a:spcAft>
+              <a:buClr>
+                <a:schemeClr val="dk2"/>
+              </a:buClr>
+              <a:buNone/>
+              <a:defRPr sz="3733" b="0" i="0" u="none" strike="noStrike" cap="none" baseline="0">
+                <a:solidFill>
+                  <a:schemeClr val="dk2"/>
+                </a:solidFill>
+                <a:latin typeface="Arial"/>
+                <a:ea typeface="Arial"/>
+                <a:cs typeface="Arial"/>
+                <a:sym typeface="Arial"/>
+              </a:defRPr>
+            </a:lvl5pPr>
+            <a:lvl6pPr marR="0" algn="l" rtl="0">
+              <a:lnSpc>
+                <a:spcPct val="115000"/>
+              </a:lnSpc>
+              <a:spcBef>
+                <a:spcPts val="0"/>
+              </a:spcBef>
+              <a:spcAft>
+                <a:spcPts val="1600"/>
+              </a:spcAft>
+              <a:buClr>
+                <a:schemeClr val="dk2"/>
+              </a:buClr>
+              <a:buNone/>
+              <a:defRPr sz="3733" b="0" i="0" u="none" strike="noStrike" cap="none" baseline="0">
+                <a:solidFill>
+                  <a:schemeClr val="dk2"/>
+                </a:solidFill>
+                <a:latin typeface="Arial"/>
+                <a:ea typeface="Arial"/>
+                <a:cs typeface="Arial"/>
+                <a:sym typeface="Arial"/>
+              </a:defRPr>
+            </a:lvl6pPr>
+            <a:lvl7pPr marR="0" algn="l" rtl="0">
+              <a:lnSpc>
+                <a:spcPct val="115000"/>
+              </a:lnSpc>
+              <a:spcBef>
+                <a:spcPts val="0"/>
+              </a:spcBef>
+              <a:spcAft>
+                <a:spcPts val="1600"/>
+              </a:spcAft>
+              <a:buClr>
+                <a:schemeClr val="dk2"/>
+              </a:buClr>
+              <a:buNone/>
+              <a:defRPr sz="3733" b="0" i="0" u="none" strike="noStrike" cap="none" baseline="0">
+                <a:solidFill>
+                  <a:schemeClr val="dk2"/>
+                </a:solidFill>
+                <a:latin typeface="Arial"/>
+                <a:ea typeface="Arial"/>
+                <a:cs typeface="Arial"/>
+                <a:sym typeface="Arial"/>
+              </a:defRPr>
+            </a:lvl7pPr>
+            <a:lvl8pPr marR="0" algn="l" rtl="0">
+              <a:lnSpc>
+                <a:spcPct val="115000"/>
+              </a:lnSpc>
+              <a:spcBef>
+                <a:spcPts val="0"/>
+              </a:spcBef>
+              <a:spcAft>
+                <a:spcPts val="1600"/>
+              </a:spcAft>
+              <a:buClr>
+                <a:schemeClr val="dk2"/>
+              </a:buClr>
+              <a:buNone/>
+              <a:defRPr sz="3733" b="0" i="0" u="none" strike="noStrike" cap="none" baseline="0">
+                <a:solidFill>
+                  <a:schemeClr val="dk2"/>
+                </a:solidFill>
+                <a:latin typeface="Arial"/>
+                <a:ea typeface="Arial"/>
+                <a:cs typeface="Arial"/>
+                <a:sym typeface="Arial"/>
+              </a:defRPr>
+            </a:lvl8pPr>
+            <a:lvl9pPr marR="0" algn="l" rtl="0">
+              <a:lnSpc>
+                <a:spcPct val="115000"/>
+              </a:lnSpc>
+              <a:spcBef>
+                <a:spcPts val="0"/>
+              </a:spcBef>
+              <a:spcAft>
+                <a:spcPts val="1600"/>
+              </a:spcAft>
+              <a:buClr>
+                <a:schemeClr val="dk2"/>
+              </a:buClr>
+              <a:buNone/>
+              <a:defRPr sz="3733" b="0" i="0" u="none" strike="noStrike" cap="none" baseline="0">
+                <a:solidFill>
+                  <a:schemeClr val="dk2"/>
+                </a:solidFill>
+                <a:latin typeface="Arial"/>
+                <a:ea typeface="Arial"/>
+                <a:cs typeface="Arial"/>
+                <a:sym typeface="Arial"/>
+              </a:defRPr>
+            </a:lvl9pPr>
+          </a:lstStyle>
+          <a:p>
+            <a:pPr>
+              <a:spcAft>
+                <a:spcPts val="800"/>
+              </a:spcAft>
+              <a:buClrTx/>
+              <a:buSzTx/>
+            </a:pPr>
+            <a:endParaRPr lang="en-US" dirty="0">
+              <a:solidFill>
+                <a:schemeClr val="bg1">
+                  <a:lumMod val="85000"/>
+                </a:schemeClr>
+              </a:solidFill>
+              <a:latin typeface="Franklin Gothic Book" panose="020B0503020102020204" pitchFamily="34" charset="0"/>
+            </a:endParaRPr>
+          </a:p>
+        </p:txBody>
+      </p:sp>
+      <p:sp>
+        <p:nvSpPr>
+          <p:cNvPr id="14" name="Номер слайда 2"/>
+          <p:cNvSpPr>
+            <a:spLocks noGrp="1"/>
+          </p:cNvSpPr>
+          <p:nvPr>
+            <p:ph type="sldNum" idx="12"/>
+          </p:nvPr>
+        </p:nvSpPr>
+        <p:spPr>
+          <a:xfrm>
+            <a:off x="22925650" y="12435243"/>
+            <a:ext cx="1484726" cy="1049600"/>
+          </a:xfrm>
+        </p:spPr>
+        <p:txBody>
+          <a:bodyPr/>
+          <a:lstStyle/>
+          <a:p>
+            <a:pPr algn="r"/>
+            <a:fld id="{1FEF3AF8-FF82-4B53-9863-FE7717B11AF3}" type="slidenum">
+              <a:rPr lang="en-US" sz="2800" b="1" smtClean="0">
+                <a:solidFill>
+                  <a:srgbClr val="92C5EB"/>
+                </a:solidFill>
+                <a:latin typeface="Segoe UI" panose="020B0502040204020203" pitchFamily="34" charset="0"/>
+                <a:cs typeface="Segoe UI" panose="020B0502040204020203" pitchFamily="34" charset="0"/>
+              </a:rPr>
+              <a:t>2</a:t>
+            </a:fld>
+            <a:endParaRPr lang="ru" sz="2800" b="1" dirty="0">
+              <a:solidFill>
+                <a:srgbClr val="92C5EB"/>
+              </a:solidFill>
+              <a:latin typeface="Segoe UI" panose="020B0502040204020203" pitchFamily="34" charset="0"/>
+              <a:cs typeface="Segoe UI" panose="020B0502040204020203" pitchFamily="34" charset="0"/>
+            </a:endParaRPr>
+          </a:p>
+        </p:txBody>
+      </p:sp>
+      <p:sp>
+        <p:nvSpPr>
+          <p:cNvPr id="41" name="TextBox 40"/>
+          <p:cNvSpPr txBox="1"/>
+          <p:nvPr/>
+        </p:nvSpPr>
+        <p:spPr>
+          <a:xfrm>
+            <a:off x="21423105" y="9481070"/>
+            <a:ext cx="2241187" cy="461665"/>
+          </a:xfrm>
+          <a:prstGeom prst="rect">
+            <a:avLst/>
+          </a:prstGeom>
+          <a:noFill/>
+        </p:spPr>
+        <p:txBody>
+          <a:bodyPr wrap="square" rtlCol="0">
+            <a:spAutoFit/>
+          </a:bodyPr>
+          <a:lstStyle/>
+          <a:p>
+            <a:endParaRPr lang="ru-RU" sz="2400" dirty="0">
+              <a:solidFill>
+                <a:schemeClr val="accent3">
+                  <a:lumMod val="50000"/>
+                </a:schemeClr>
+              </a:solidFill>
+              <a:latin typeface="Franklin Gothic Book" panose="020B0503020102020204" pitchFamily="34" charset="0"/>
+            </a:endParaRPr>
+          </a:p>
+        </p:txBody>
+      </p:sp>
+      <p:sp>
+        <p:nvSpPr>
+          <p:cNvPr id="21" name="Текст 2"/>
+          <p:cNvSpPr>
+            <a:spLocks noGrp="1"/>
+          </p:cNvSpPr>
+          <p:nvPr>
+            <p:ph type="body" idx="1"/>
+          </p:nvPr>
+        </p:nvSpPr>
+        <p:spPr>
+          <a:xfrm>
+            <a:off x="931333" y="3905251"/>
+            <a:ext cx="7119574" cy="4176886"/>
+          </a:xfrm>
+        </p:spPr>
+        <p:txBody>
+          <a:bodyPr/>
+          <a:lstStyle/>
+          <a:p>
+            <a:endParaRPr lang="en-US" dirty="0">
+              <a:solidFill>
+                <a:schemeClr val="accent3">
+                  <a:lumMod val="75000"/>
+                </a:schemeClr>
+              </a:solidFill>
+              <a:latin typeface="Franklin Gothic Book" panose="020B0503020102020204" pitchFamily="34" charset="0"/>
+            </a:endParaRPr>
+          </a:p>
+          <a:p>
+            <a:endParaRPr lang="ru-RU" dirty="0"/>
+          </a:p>
+        </p:txBody>
+      </p:sp>
+      <p:sp>
+        <p:nvSpPr>
+          <p:cNvPr id="24" name="Текст 4"/>
+          <p:cNvSpPr>
+            <a:spLocks noGrp="1"/>
+          </p:cNvSpPr>
+          <p:nvPr>
+            <p:ph type="body" idx="13"/>
+          </p:nvPr>
+        </p:nvSpPr>
+        <p:spPr>
+          <a:xfrm>
+            <a:off x="1984853" y="4207219"/>
+            <a:ext cx="6874082" cy="4176886"/>
+          </a:xfrm>
+        </p:spPr>
+        <p:txBody>
+          <a:bodyPr/>
+          <a:lstStyle/>
+          <a:p>
+            <a:r>
+              <a:rPr lang="ru-RU" dirty="0">
+                <a:solidFill>
+                  <a:schemeClr val="accent3">
+                    <a:lumMod val="75000"/>
+                  </a:schemeClr>
+                </a:solidFill>
+                <a:latin typeface="Franklin Gothic Book" panose="020B0503020102020204" pitchFamily="34" charset="0"/>
+              </a:rPr>
+              <a:t>Экспоненциальный рост сложности современных моделей</a:t>
+            </a:r>
+            <a:r>
+              <a:rPr lang="en-US" dirty="0">
+                <a:solidFill>
+                  <a:schemeClr val="accent3">
+                    <a:lumMod val="75000"/>
+                  </a:schemeClr>
+                </a:solidFill>
+                <a:latin typeface="Franklin Gothic Book" panose="020B0503020102020204" pitchFamily="34" charset="0"/>
+              </a:rPr>
+              <a:t>. </a:t>
+            </a:r>
+            <a:endParaRPr lang="ru-RU" dirty="0">
+              <a:solidFill>
+                <a:schemeClr val="accent3">
+                  <a:lumMod val="75000"/>
+                </a:schemeClr>
+              </a:solidFill>
+              <a:latin typeface="Franklin Gothic Book" panose="020B0503020102020204" pitchFamily="34" charset="0"/>
+            </a:endParaRPr>
+          </a:p>
+          <a:p>
+            <a:r>
+              <a:rPr lang="ru-RU" dirty="0">
+                <a:solidFill>
+                  <a:schemeClr val="accent3">
+                    <a:lumMod val="75000"/>
+                  </a:schemeClr>
+                </a:solidFill>
+                <a:latin typeface="Franklin Gothic Book" panose="020B0503020102020204" pitchFamily="34" charset="0"/>
+              </a:rPr>
+              <a:t>На графике по вертикальной логарифмической оси вычислительная мощность обучения моделей</a:t>
+            </a:r>
+            <a:r>
+              <a:rPr lang="en-US" dirty="0">
+                <a:solidFill>
+                  <a:schemeClr val="accent3">
+                    <a:lumMod val="75000"/>
+                  </a:schemeClr>
+                </a:solidFill>
+                <a:latin typeface="Franklin Gothic Book" panose="020B0503020102020204" pitchFamily="34" charset="0"/>
+              </a:rPr>
+              <a:t>.</a:t>
+            </a:r>
+          </a:p>
+        </p:txBody>
+      </p:sp>
+      <p:sp>
+        <p:nvSpPr>
+          <p:cNvPr id="26" name="Текст 5"/>
+          <p:cNvSpPr>
+            <a:spLocks noGrp="1"/>
+          </p:cNvSpPr>
+          <p:nvPr>
+            <p:ph type="body" idx="14"/>
+          </p:nvPr>
+        </p:nvSpPr>
+        <p:spPr>
+          <a:xfrm>
+            <a:off x="16082488" y="3900521"/>
+            <a:ext cx="7119574" cy="4176886"/>
+          </a:xfrm>
+        </p:spPr>
+        <p:txBody>
+          <a:bodyPr/>
+          <a:lstStyle/>
+          <a:p>
+            <a:pPr lvl="0">
+              <a:spcAft>
+                <a:spcPts val="800"/>
+              </a:spcAft>
+              <a:buClrTx/>
+              <a:buSzTx/>
+            </a:pPr>
+            <a:endParaRPr lang="ru-RU" b="1" dirty="0">
+              <a:solidFill>
+                <a:srgbClr val="7C7C7C">
+                  <a:lumMod val="75000"/>
+                </a:srgbClr>
+              </a:solidFill>
+              <a:latin typeface="Arial" panose="020B0604020202020204" pitchFamily="34" charset="0"/>
+              <a:cs typeface="Arial" panose="020B0604020202020204" pitchFamily="34" charset="0"/>
+            </a:endParaRPr>
+          </a:p>
+        </p:txBody>
+      </p:sp>
+      <p:pic>
+        <p:nvPicPr>
+          <p:cNvPr id="4" name="Picture 3">
+            <a:extLst>
+              <a:ext uri="{FF2B5EF4-FFF2-40B4-BE49-F238E27FC236}">
+                <a16:creationId xmlns:a16="http://schemas.microsoft.com/office/drawing/2014/main" id="{A913D479-C8EE-D458-0E31-CBF9997CE529}"/>
+              </a:ext>
+            </a:extLst>
+          </p:cNvPr>
+          <p:cNvPicPr>
+            <a:picLocks noChangeAspect="1"/>
+          </p:cNvPicPr>
+          <p:nvPr/>
+        </p:nvPicPr>
+        <p:blipFill>
+          <a:blip r:embed="rId3"/>
+          <a:stretch>
+            <a:fillRect/>
+          </a:stretch>
+        </p:blipFill>
+        <p:spPr>
+          <a:xfrm>
+            <a:off x="9179652" y="3512488"/>
+            <a:ext cx="14008220" cy="9818724"/>
+          </a:xfrm>
+          <a:prstGeom prst="rect">
+            <a:avLst/>
+          </a:prstGeom>
+        </p:spPr>
+      </p:pic>
+    </p:spTree>
+    <p:extLst>
+      <p:ext uri="{BB962C8B-B14F-4D97-AF65-F5344CB8AC3E}">
+        <p14:creationId xmlns:p14="http://schemas.microsoft.com/office/powerpoint/2010/main" val="467786867"/>
+      </p:ext>
+    </p:extLst>
+  </p:cSld>
+  <p:clrMapOvr>
+    <a:masterClrMapping/>
+  </p:clrMapOvr>
+</p:sld>
+</file>
+
+<file path=ppt/slides/slide3.xml><?xml version="1.0" encoding="utf-8"?>
+<p:sld xmlns:a="http://schemas.openxmlformats.org/drawingml/2006/main" xmlns:r="http://schemas.openxmlformats.org/officeDocument/2006/relationships" xmlns:p="http://schemas.openxmlformats.org/presentationml/2006/main">
+  <p:cSld>
+    <p:spTree>
+      <p:nvGrpSpPr>
         <p:cNvPr id="1" name=""/>
         <p:cNvGrpSpPr/>
         <p:nvPr/>
@@ -7043,8 +8294,8 @@
         </p:nvSpPr>
         <p:spPr>
           <a:xfrm>
-            <a:off x="10351758" y="0"/>
-            <a:ext cx="14369951" cy="13921933"/>
+            <a:off x="9275043" y="0"/>
+            <a:ext cx="15450070" cy="15042253"/>
           </a:xfrm>
           <a:prstGeom prst="rect">
             <a:avLst/>
@@ -7144,7 +8395,7 @@
             <a:fld id="{00000000-1234-1234-1234-123412341234}" type="slidenum">
               <a:rPr lang="ru-RU" smtClean="0"/>
               <a:pPr/>
-              <a:t>2</a:t>
+              <a:t>3</a:t>
             </a:fld>
             <a:endParaRPr lang="ru-RU" dirty="0"/>
           </a:p>
@@ -7162,8 +8413,8 @@
         </p:nvSpPr>
         <p:spPr>
           <a:xfrm>
-            <a:off x="17892761" y="3905250"/>
-            <a:ext cx="5495850" cy="8187399"/>
+            <a:off x="17892760" y="3905250"/>
+            <a:ext cx="6517615" cy="8187399"/>
           </a:xfrm>
         </p:spPr>
         <p:txBody>
@@ -7179,7 +8430,7 @@
               </a:buClr>
             </a:pPr>
             <a:r>
-              <a:rPr lang="ru-RU" b="1" spc="13" dirty="0" err="1">
+              <a:rPr lang="ru-RU" sz="4400" b="1" spc="13" dirty="0" err="1">
                 <a:solidFill>
                   <a:srgbClr val="7C7C7C">
                     <a:lumMod val="50000"/>
@@ -7190,7 +8441,7 @@
               </a:rPr>
               <a:t>Кодогенерация</a:t>
             </a:r>
-            <a:endParaRPr lang="en-US" dirty="0">
+            <a:endParaRPr lang="en-US" sz="4400" dirty="0">
               <a:solidFill>
                 <a:srgbClr val="525252"/>
               </a:solidFill>
@@ -7208,13 +8459,18 @@
               <a:buChar char="•"/>
             </a:pPr>
             <a:r>
-              <a:rPr lang="en-US" dirty="0">
+              <a:rPr lang="ru-RU" sz="4400" dirty="0">
                 <a:solidFill>
                   <a:srgbClr val="525252"/>
                 </a:solidFill>
               </a:rPr>
-              <a:t>DMA insertion</a:t>
+              <a:t>Прямой доступ а память</a:t>
             </a:r>
+            <a:endParaRPr lang="en-US" sz="4400" dirty="0">
+              <a:solidFill>
+                <a:srgbClr val="525252"/>
+              </a:solidFill>
+            </a:endParaRPr>
           </a:p>
           <a:p>
             <a:pPr marL="457200" lvl="0" indent="-457200">
@@ -7228,12 +8484,36 @@
               <a:buChar char="•"/>
             </a:pPr>
             <a:r>
-              <a:rPr lang="en-US" dirty="0">
+              <a:rPr lang="ru-RU" sz="4400" dirty="0">
                 <a:solidFill>
                   <a:srgbClr val="525252"/>
                 </a:solidFill>
               </a:rPr>
-              <a:t>Explicit cache management</a:t>
+              <a:t>Векторизация 1</a:t>
+            </a:r>
+            <a:r>
+              <a:rPr lang="en-US" sz="4400" dirty="0">
+                <a:solidFill>
+                  <a:srgbClr val="525252"/>
+                </a:solidFill>
+              </a:rPr>
+              <a:t>D, </a:t>
+            </a:r>
+            <a:r>
+              <a:rPr lang="ru-RU" sz="4400" dirty="0">
+                <a:solidFill>
+                  <a:srgbClr val="525252"/>
+                </a:solidFill>
+              </a:rPr>
+              <a:t>2</a:t>
+            </a:r>
+            <a:r>
+              <a:rPr lang="en-US" sz="4400" dirty="0">
+                <a:solidFill>
+                  <a:srgbClr val="525252"/>
+                </a:solidFill>
+              </a:rPr>
+              <a:t>D </a:t>
             </a:r>
           </a:p>
           <a:p>
@@ -7248,37 +8528,18 @@
               <a:buChar char="•"/>
             </a:pPr>
             <a:r>
-              <a:rPr lang="ru-RU" dirty="0">
+              <a:rPr lang="ru-RU" sz="4400" dirty="0">
                 <a:solidFill>
                   <a:srgbClr val="525252"/>
                 </a:solidFill>
               </a:rPr>
-              <a:t>Векторизация 1</a:t>
+              <a:t>Оптимизация разметки регионов памяти</a:t>
             </a:r>
-            <a:r>
-              <a:rPr lang="en-US" dirty="0">
-                <a:solidFill>
-                  <a:srgbClr val="525252"/>
-                </a:solidFill>
-              </a:rPr>
-              <a:t>D, </a:t>
-            </a:r>
-            <a:r>
-              <a:rPr lang="ru-RU" dirty="0">
-                <a:solidFill>
-                  <a:srgbClr val="525252"/>
-                </a:solidFill>
-              </a:rPr>
-              <a:t>2</a:t>
-            </a:r>
-            <a:r>
-              <a:rPr lang="en-US" dirty="0">
-                <a:solidFill>
-                  <a:srgbClr val="525252"/>
-                </a:solidFill>
-              </a:rPr>
-              <a:t>D </a:t>
-            </a:r>
+            <a:endParaRPr lang="en-US" sz="4400" dirty="0">
+              <a:solidFill>
+                <a:srgbClr val="525252"/>
+              </a:solidFill>
+            </a:endParaRPr>
           </a:p>
           <a:p>
             <a:pPr marL="457200" lvl="0" indent="-457200">
@@ -7292,14 +8553,22 @@
               <a:buChar char="•"/>
             </a:pPr>
             <a:r>
-              <a:rPr lang="en-US" dirty="0">
+              <a:rPr lang="ru-RU" sz="4400" dirty="0">
                 <a:solidFill>
                   <a:srgbClr val="525252"/>
                 </a:solidFill>
               </a:rPr>
-              <a:t>Memory tiling </a:t>
+              <a:t>Планирование инструкций</a:t>
             </a:r>
-            <a:endParaRPr lang="ru-RU" dirty="0">
+            <a:r>
+              <a:rPr lang="en-US" sz="4400" dirty="0">
+                <a:solidFill>
+                  <a:srgbClr val="525252"/>
+                </a:solidFill>
+              </a:rPr>
+              <a:t> </a:t>
+            </a:r>
+            <a:endParaRPr lang="ru-RU" sz="4400" dirty="0">
               <a:solidFill>
                 <a:srgbClr val="525252"/>
               </a:solidFill>
@@ -7320,7 +8589,7 @@
         </p:nvSpPr>
         <p:spPr>
           <a:xfrm>
-            <a:off x="12262420" y="704070"/>
+            <a:off x="11803197" y="1220810"/>
             <a:ext cx="11473880" cy="2736303"/>
           </a:xfrm>
           <a:prstGeom prst="rect">
@@ -7582,7 +8851,7 @@
             </a:r>
             <a:r>
               <a:rPr lang="ru-RU" dirty="0"/>
-              <a:t>позволяющая производить преобразования графов исполнения высокоуровневых операций и не только</a:t>
+              <a:t>позволяющая создавать новые диалекты и оптимизации на них</a:t>
             </a:r>
             <a:r>
               <a:rPr lang="en-US" dirty="0"/>
@@ -7606,8 +8875,8 @@
         </p:nvSpPr>
         <p:spPr>
           <a:xfrm>
-            <a:off x="12804181" y="3990882"/>
-            <a:ext cx="5256584" cy="3949799"/>
+            <a:off x="9635394" y="3985105"/>
+            <a:ext cx="7848561" cy="5919569"/>
           </a:xfrm>
           <a:prstGeom prst="rect">
             <a:avLst/>
@@ -7629,7 +8898,7 @@
               </a:buClr>
             </a:pPr>
             <a:r>
-              <a:rPr lang="ru-RU" sz="3200" b="1" spc="13" dirty="0">
+              <a:rPr lang="ru-RU" sz="4400" b="1" spc="13" dirty="0">
                 <a:solidFill>
                   <a:srgbClr val="7C7C7C">
                     <a:lumMod val="50000"/>
@@ -7641,7 +8910,7 @@
               <a:t>Оптимизация </a:t>
             </a:r>
             <a:r>
-              <a:rPr lang="en-US" sz="3200" b="1" spc="13" dirty="0">
+              <a:rPr lang="en-US" sz="4400" b="1" spc="13" dirty="0">
                 <a:solidFill>
                   <a:srgbClr val="7C7C7C">
                     <a:lumMod val="50000"/>
@@ -7665,13 +8934,18 @@
               <a:buChar char="•"/>
             </a:pPr>
             <a:r>
-              <a:rPr lang="en-US" sz="3200" dirty="0">
+              <a:rPr lang="ru-RU" sz="4400" dirty="0">
                 <a:solidFill>
                   <a:srgbClr val="525252"/>
                 </a:solidFill>
               </a:rPr>
-              <a:t>Operations control flow graph</a:t>
+              <a:t>Граф потока исполнения операций</a:t>
             </a:r>
+            <a:endParaRPr lang="en-US" sz="4400" dirty="0">
+              <a:solidFill>
+                <a:srgbClr val="525252"/>
+              </a:solidFill>
+            </a:endParaRPr>
           </a:p>
           <a:p>
             <a:pPr marL="457200" lvl="0" indent="-457200">
@@ -7685,13 +8959,18 @@
               <a:buChar char="•"/>
             </a:pPr>
             <a:r>
-              <a:rPr lang="en-US" sz="3200" dirty="0">
+              <a:rPr lang="ru-RU" sz="4400" dirty="0">
                 <a:solidFill>
                   <a:srgbClr val="525252"/>
                 </a:solidFill>
               </a:rPr>
-              <a:t>Graphs transformation</a:t>
+              <a:t>Трансформация графов</a:t>
             </a:r>
+            <a:endParaRPr lang="en-US" sz="4400" dirty="0">
+              <a:solidFill>
+                <a:srgbClr val="525252"/>
+              </a:solidFill>
+            </a:endParaRPr>
           </a:p>
           <a:p>
             <a:pPr marL="457200" lvl="0" indent="-457200">
@@ -7705,13 +8984,18 @@
               <a:buChar char="•"/>
             </a:pPr>
             <a:r>
-              <a:rPr lang="en-US" sz="3200" dirty="0">
+              <a:rPr lang="ru-RU" sz="4400" dirty="0">
                 <a:solidFill>
                   <a:srgbClr val="525252"/>
                 </a:solidFill>
               </a:rPr>
-              <a:t>Loop tiling &amp; unrolling</a:t>
+              <a:t>Склеивание и разворачивание циклов</a:t>
             </a:r>
+            <a:endParaRPr lang="en-US" sz="4400" dirty="0">
+              <a:solidFill>
+                <a:srgbClr val="525252"/>
+              </a:solidFill>
+            </a:endParaRPr>
           </a:p>
           <a:p>
             <a:pPr marL="457200" lvl="0" indent="-457200">
@@ -7725,51 +9009,12 @@
               <a:buChar char="•"/>
             </a:pPr>
             <a:r>
-              <a:rPr lang="en-US" sz="3200" dirty="0">
+              <a:rPr lang="ru-RU" sz="4400" dirty="0">
                 <a:solidFill>
                   <a:srgbClr val="525252"/>
                 </a:solidFill>
               </a:rPr>
-              <a:t>Quantization on DL graphs </a:t>
-            </a:r>
-          </a:p>
-        </p:txBody>
-      </p:sp>
-      <p:sp>
-        <p:nvSpPr>
-          <p:cNvPr id="31" name="TextBox 30">
-            <a:extLst>
-              <a:ext uri="{FF2B5EF4-FFF2-40B4-BE49-F238E27FC236}">
-                <a16:creationId xmlns:a16="http://schemas.microsoft.com/office/drawing/2014/main" id="{E8138AE0-48C8-14A9-FE05-0932DECC04CD}"/>
-              </a:ext>
-            </a:extLst>
-          </p:cNvPr>
-          <p:cNvSpPr txBox="1"/>
-          <p:nvPr/>
-        </p:nvSpPr>
-        <p:spPr>
-          <a:xfrm>
-            <a:off x="17995211" y="11408233"/>
-            <a:ext cx="7776864" cy="672172"/>
-          </a:xfrm>
-          <a:prstGeom prst="rect">
-            <a:avLst/>
-          </a:prstGeom>
-          <a:noFill/>
-        </p:spPr>
-        <p:txBody>
-          <a:bodyPr wrap="square" rtlCol="0">
-            <a:spAutoFit/>
-          </a:bodyPr>
-          <a:lstStyle/>
-          <a:p>
-            <a:r>
-              <a:rPr lang="en-US" dirty="0">
-                <a:solidFill>
-                  <a:srgbClr val="0072BC"/>
-                </a:solidFill>
-              </a:rPr>
-              <a:t>And many more… </a:t>
+              <a:t>Спекулятивные вычисления</a:t>
             </a:r>
           </a:p>
         </p:txBody>
@@ -7951,7 +9196,7 @@
 </p:sld>
 </file>
 
-<file path=ppt/slides/slide3.xml><?xml version="1.0" encoding="utf-8"?>
+<file path=ppt/slides/slide4.xml><?xml version="1.0" encoding="utf-8"?>
 <p:sld xmlns:a="http://schemas.openxmlformats.org/drawingml/2006/main" xmlns:r="http://schemas.openxmlformats.org/officeDocument/2006/relationships" xmlns:p="http://schemas.openxmlformats.org/presentationml/2006/main">
   <p:cSld>
     <p:spTree>
@@ -7992,7 +9237,7 @@
               <a:rPr lang="ru-RU" sz="9600" dirty="0">
                 <a:latin typeface="+mj-lt"/>
               </a:rPr>
-              <a:t>Использование профиля при компиляции</a:t>
+              <a:t>Цель - использование профиля при компиляции</a:t>
             </a:r>
             <a:br>
               <a:rPr lang="ru" sz="2400" dirty="0"/>
@@ -8848,7 +10093,7 @@
                 <a:latin typeface="Segoe UI" panose="020B0502040204020203" pitchFamily="34" charset="0"/>
                 <a:cs typeface="Segoe UI" panose="020B0502040204020203" pitchFamily="34" charset="0"/>
               </a:rPr>
-              <a:t>3</a:t>
+              <a:t>4</a:t>
             </a:fld>
             <a:endParaRPr lang="ru" sz="2800" b="1" dirty="0">
               <a:solidFill>
@@ -8958,183 +10203,12 @@
           </a:p>
         </p:txBody>
       </p:sp>
-      <p:sp>
-        <p:nvSpPr>
-          <p:cNvPr id="26" name="Текст 5"/>
-          <p:cNvSpPr>
-            <a:spLocks noGrp="1"/>
-          </p:cNvSpPr>
-          <p:nvPr>
-            <p:ph type="body" idx="14"/>
-          </p:nvPr>
-        </p:nvSpPr>
-        <p:spPr>
-          <a:xfrm>
-            <a:off x="16082488" y="3900521"/>
-            <a:ext cx="7119574" cy="4176886"/>
-          </a:xfrm>
-        </p:spPr>
-        <p:txBody>
-          <a:bodyPr/>
-          <a:lstStyle/>
-          <a:p>
-            <a:pPr lvl="0">
-              <a:spcAft>
-                <a:spcPts val="800"/>
-              </a:spcAft>
-              <a:buClrTx/>
-              <a:buSzTx/>
-            </a:pPr>
-            <a:r>
-              <a:rPr lang="ru-RU" sz="4400" b="1" dirty="0">
-                <a:solidFill>
-                  <a:srgbClr val="7C7C7C">
-                    <a:lumMod val="75000"/>
-                  </a:srgbClr>
-                </a:solidFill>
-                <a:latin typeface="Arial" panose="020B0604020202020204" pitchFamily="34" charset="0"/>
-                <a:cs typeface="Arial" panose="020B0604020202020204" pitchFamily="34" charset="0"/>
-              </a:rPr>
-              <a:t>Инструменты</a:t>
-            </a:r>
-            <a:endParaRPr lang="en-US" sz="4400" b="1" dirty="0">
-              <a:solidFill>
-                <a:srgbClr val="7C7C7C">
-                  <a:lumMod val="75000"/>
-                </a:srgbClr>
-              </a:solidFill>
-              <a:latin typeface="Arial" panose="020B0604020202020204" pitchFamily="34" charset="0"/>
-              <a:cs typeface="Arial" panose="020B0604020202020204" pitchFamily="34" charset="0"/>
-            </a:endParaRPr>
-          </a:p>
-          <a:p>
-            <a:pPr marL="457200" lvl="0" indent="-457200">
-              <a:spcAft>
-                <a:spcPts val="800"/>
-              </a:spcAft>
-              <a:buClr>
-                <a:srgbClr val="0072BC"/>
-              </a:buClr>
-              <a:buSzTx/>
-              <a:buFont typeface="Arial" panose="020B0604020202020204" pitchFamily="34" charset="0"/>
-              <a:buChar char="•"/>
-            </a:pPr>
-            <a:r>
-              <a:rPr lang="en-US" sz="4400" dirty="0" err="1">
-                <a:solidFill>
-                  <a:srgbClr val="7C7C7C">
-                    <a:lumMod val="75000"/>
-                  </a:srgbClr>
-                </a:solidFill>
-                <a:cs typeface="Arial" panose="020B0604020202020204" pitchFamily="34" charset="0"/>
-              </a:rPr>
-              <a:t>Pytorch</a:t>
-            </a:r>
-            <a:r>
-              <a:rPr lang="en-US" sz="4400" dirty="0">
-                <a:solidFill>
-                  <a:srgbClr val="7C7C7C">
-                    <a:lumMod val="75000"/>
-                  </a:srgbClr>
-                </a:solidFill>
-                <a:cs typeface="Arial" panose="020B0604020202020204" pitchFamily="34" charset="0"/>
-              </a:rPr>
-              <a:t> profiler</a:t>
-            </a:r>
-          </a:p>
-          <a:p>
-            <a:pPr marL="457200" lvl="0" indent="-457200">
-              <a:spcAft>
-                <a:spcPts val="800"/>
-              </a:spcAft>
-              <a:buClr>
-                <a:srgbClr val="0072BC"/>
-              </a:buClr>
-              <a:buSzTx/>
-              <a:buFont typeface="Arial" panose="020B0604020202020204" pitchFamily="34" charset="0"/>
-              <a:buChar char="•"/>
-            </a:pPr>
-            <a:r>
-              <a:rPr lang="en-US" sz="4400" dirty="0" err="1">
-                <a:solidFill>
-                  <a:srgbClr val="7C7C7C">
-                    <a:lumMod val="75000"/>
-                  </a:srgbClr>
-                </a:solidFill>
-                <a:cs typeface="Arial" panose="020B0604020202020204" pitchFamily="34" charset="0"/>
-              </a:rPr>
-              <a:t>Tensorflow</a:t>
-            </a:r>
-            <a:r>
-              <a:rPr lang="en-US" sz="4400" dirty="0">
-                <a:solidFill>
-                  <a:srgbClr val="7C7C7C">
-                    <a:lumMod val="75000"/>
-                  </a:srgbClr>
-                </a:solidFill>
-                <a:cs typeface="Arial" panose="020B0604020202020204" pitchFamily="34" charset="0"/>
-              </a:rPr>
-              <a:t> profiler</a:t>
-            </a:r>
-          </a:p>
-          <a:p>
-            <a:pPr marL="457200" lvl="0" indent="-457200">
-              <a:spcAft>
-                <a:spcPts val="800"/>
-              </a:spcAft>
-              <a:buClr>
-                <a:srgbClr val="0072BC"/>
-              </a:buClr>
-              <a:buSzTx/>
-              <a:buFont typeface="Arial" panose="020B0604020202020204" pitchFamily="34" charset="0"/>
-              <a:buChar char="•"/>
-            </a:pPr>
-            <a:r>
-              <a:rPr lang="en-US" sz="4400" dirty="0">
-                <a:solidFill>
-                  <a:srgbClr val="7C7C7C">
-                    <a:lumMod val="75000"/>
-                  </a:srgbClr>
-                </a:solidFill>
-                <a:cs typeface="Arial" panose="020B0604020202020204" pitchFamily="34" charset="0"/>
-              </a:rPr>
-              <a:t>Linux perf</a:t>
-            </a:r>
-            <a:endParaRPr lang="en-US" dirty="0">
-              <a:solidFill>
-                <a:srgbClr val="7C7C7C">
-                  <a:lumMod val="75000"/>
-                </a:srgbClr>
-              </a:solidFill>
-              <a:cs typeface="Arial" panose="020B0604020202020204" pitchFamily="34" charset="0"/>
-            </a:endParaRPr>
-          </a:p>
-          <a:p>
-            <a:pPr lvl="0">
-              <a:spcAft>
-                <a:spcPts val="800"/>
-              </a:spcAft>
-              <a:buClrTx/>
-              <a:buSzTx/>
-            </a:pPr>
-            <a:endParaRPr lang="ru-RU" b="1" dirty="0">
-              <a:solidFill>
-                <a:srgbClr val="7C7C7C">
-                  <a:lumMod val="75000"/>
-                </a:srgbClr>
-              </a:solidFill>
-              <a:latin typeface="Arial" panose="020B0604020202020204" pitchFamily="34" charset="0"/>
-              <a:cs typeface="Arial" panose="020B0604020202020204" pitchFamily="34" charset="0"/>
-            </a:endParaRPr>
-          </a:p>
-        </p:txBody>
-      </p:sp>
       <p:pic>
         <p:nvPicPr>
-          <p:cNvPr id="3" name="Picture 2">
+          <p:cNvPr id="4" name="Picture 3">
             <a:extLst>
               <a:ext uri="{FF2B5EF4-FFF2-40B4-BE49-F238E27FC236}">
-                <a16:creationId xmlns:a16="http://schemas.microsoft.com/office/drawing/2014/main" id="{E3260EA8-C019-8E88-0FA8-9405C722B796}"/>
+                <a16:creationId xmlns:a16="http://schemas.microsoft.com/office/drawing/2014/main" id="{DAA8E6B7-9BA2-C20A-391D-43A38E06D80B}"/>
               </a:ext>
             </a:extLst>
           </p:cNvPr>
@@ -9151,424 +10225,8 @@
         </p:blipFill>
         <p:spPr>
           <a:xfrm>
-            <a:off x="883251" y="4040766"/>
-            <a:ext cx="13669168" cy="8394477"/>
-          </a:xfrm>
-          <a:prstGeom prst="rect">
-            <a:avLst/>
-          </a:prstGeom>
-        </p:spPr>
-      </p:pic>
-    </p:spTree>
-  </p:cSld>
-  <p:clrMapOvr>
-    <a:masterClrMapping/>
-  </p:clrMapOvr>
-</p:sld>
-</file>
-
-<file path=ppt/slides/slide4.xml><?xml version="1.0" encoding="utf-8"?>
-<p:sld xmlns:a="http://schemas.openxmlformats.org/drawingml/2006/main" xmlns:r="http://schemas.openxmlformats.org/officeDocument/2006/relationships" xmlns:p="http://schemas.openxmlformats.org/presentationml/2006/main">
-  <p:cSld>
-    <p:spTree>
-      <p:nvGrpSpPr>
-        <p:cNvPr id="1" name=""/>
-        <p:cNvGrpSpPr/>
-        <p:nvPr/>
-      </p:nvGrpSpPr>
-      <p:grpSpPr>
-        <a:xfrm>
-          <a:off x="0" y="0"/>
-          <a:ext cx="0" cy="0"/>
-          <a:chOff x="0" y="0"/>
-          <a:chExt cx="0" cy="0"/>
-        </a:xfrm>
-      </p:grpSpPr>
-      <p:sp>
-        <p:nvSpPr>
-          <p:cNvPr id="2" name="Заголовок 1"/>
-          <p:cNvSpPr>
-            <a:spLocks noGrp="1"/>
-          </p:cNvSpPr>
-          <p:nvPr>
-            <p:ph type="title"/>
-          </p:nvPr>
-        </p:nvSpPr>
-        <p:spPr/>
-        <p:txBody>
-          <a:bodyPr/>
-          <a:lstStyle/>
-          <a:p>
-            <a:r>
-              <a:rPr lang="ru-RU" dirty="0"/>
-              <a:t>Решение</a:t>
-            </a:r>
-          </a:p>
-        </p:txBody>
-      </p:sp>
-      <p:sp>
-        <p:nvSpPr>
-          <p:cNvPr id="4" name="Номер слайда 3"/>
-          <p:cNvSpPr>
-            <a:spLocks noGrp="1"/>
-          </p:cNvSpPr>
-          <p:nvPr>
-            <p:ph type="sldNum" idx="12"/>
-          </p:nvPr>
-        </p:nvSpPr>
-        <p:spPr/>
-        <p:txBody>
-          <a:bodyPr/>
-          <a:lstStyle/>
-          <a:p>
-            <a:fld id="{00000000-1234-1234-1234-123412341234}" type="slidenum">
-              <a:rPr lang="ru-RU" smtClean="0"/>
-              <a:pPr/>
-              <a:t>4</a:t>
-            </a:fld>
-            <a:endParaRPr lang="ru-RU" dirty="0"/>
-          </a:p>
-        </p:txBody>
-      </p:sp>
-      <p:sp>
-        <p:nvSpPr>
-          <p:cNvPr id="6" name="Текст 5"/>
-          <p:cNvSpPr>
-            <a:spLocks noGrp="1"/>
-          </p:cNvSpPr>
-          <p:nvPr>
-            <p:ph type="body" idx="14"/>
-          </p:nvPr>
-        </p:nvSpPr>
-        <p:spPr>
-          <a:xfrm>
-            <a:off x="-1874195" y="7650088"/>
-            <a:ext cx="2455391" cy="936525"/>
-          </a:xfrm>
-        </p:spPr>
-        <p:txBody>
-          <a:bodyPr/>
-          <a:lstStyle/>
-          <a:p>
-            <a:pPr lvl="0">
-              <a:spcAft>
-                <a:spcPts val="800"/>
-              </a:spcAft>
-              <a:buClr>
-                <a:srgbClr val="525252"/>
-              </a:buClr>
-            </a:pPr>
-            <a:endParaRPr lang="en-US" dirty="0">
-              <a:solidFill>
-                <a:srgbClr val="525252"/>
-              </a:solidFill>
-            </a:endParaRPr>
-          </a:p>
-          <a:p>
-            <a:pPr lvl="0">
-              <a:buClr>
-                <a:srgbClr val="525252"/>
-              </a:buClr>
-            </a:pPr>
-            <a:endParaRPr lang="ru-RU" dirty="0">
-              <a:solidFill>
-                <a:srgbClr val="525252"/>
-              </a:solidFill>
-            </a:endParaRPr>
-          </a:p>
-          <a:p>
-            <a:endParaRPr lang="ru-RU" dirty="0"/>
-          </a:p>
-        </p:txBody>
-      </p:sp>
-      <p:sp>
-        <p:nvSpPr>
-          <p:cNvPr id="13" name="Текст 4"/>
-          <p:cNvSpPr txBox="1">
-            <a:spLocks/>
-          </p:cNvSpPr>
-          <p:nvPr/>
-        </p:nvSpPr>
-        <p:spPr>
-          <a:xfrm>
-            <a:off x="12255941" y="760788"/>
-            <a:ext cx="5320208" cy="2928860"/>
-          </a:xfrm>
-          <a:prstGeom prst="rect">
-            <a:avLst/>
-          </a:prstGeom>
-          <a:noFill/>
-          <a:ln>
-            <a:noFill/>
-          </a:ln>
-        </p:spPr>
-        <p:txBody>
-          <a:bodyPr lIns="91425" tIns="91425" rIns="91425" bIns="91425" anchor="t" anchorCtr="0"/>
-          <a:lstStyle>
-            <a:defPPr marR="0" algn="l" rtl="0">
-              <a:lnSpc>
-                <a:spcPct val="100000"/>
-              </a:lnSpc>
-              <a:spcBef>
-                <a:spcPts val="0"/>
-              </a:spcBef>
-              <a:spcAft>
-                <a:spcPts val="0"/>
-              </a:spcAft>
-            </a:defPPr>
-            <a:lvl1pPr marR="0" algn="l" rtl="0">
-              <a:lnSpc>
-                <a:spcPct val="100000"/>
-              </a:lnSpc>
-              <a:spcBef>
-                <a:spcPts val="0"/>
-              </a:spcBef>
-              <a:spcAft>
-                <a:spcPts val="1600"/>
-              </a:spcAft>
-              <a:buClr>
-                <a:schemeClr val="dk2"/>
-              </a:buClr>
-              <a:buSzPct val="100000"/>
-              <a:buNone/>
-              <a:defRPr sz="3200" b="0" i="0" u="none" strike="noStrike" cap="none" spc="-5" baseline="0" dirty="0">
-                <a:solidFill>
-                  <a:schemeClr val="dk2"/>
-                </a:solidFill>
-                <a:latin typeface="+mn-lt"/>
-                <a:ea typeface="Arial"/>
-                <a:cs typeface="Arial"/>
-                <a:sym typeface="Arial"/>
-              </a:defRPr>
-            </a:lvl1pPr>
-            <a:lvl2pPr marR="0" algn="l" rtl="0">
-              <a:lnSpc>
-                <a:spcPct val="115000"/>
-              </a:lnSpc>
-              <a:spcBef>
-                <a:spcPts val="0"/>
-              </a:spcBef>
-              <a:spcAft>
-                <a:spcPts val="1600"/>
-              </a:spcAft>
-              <a:buClr>
-                <a:schemeClr val="dk2"/>
-              </a:buClr>
-              <a:buNone/>
-              <a:defRPr sz="3733" b="0" i="0" u="none" strike="noStrike" cap="none" baseline="0">
-                <a:solidFill>
-                  <a:schemeClr val="dk2"/>
-                </a:solidFill>
-                <a:latin typeface="Arial"/>
-                <a:ea typeface="Arial"/>
-                <a:cs typeface="Arial"/>
-                <a:sym typeface="Arial"/>
-              </a:defRPr>
-            </a:lvl2pPr>
-            <a:lvl3pPr marR="0" algn="l" rtl="0">
-              <a:lnSpc>
-                <a:spcPct val="115000"/>
-              </a:lnSpc>
-              <a:spcBef>
-                <a:spcPts val="0"/>
-              </a:spcBef>
-              <a:spcAft>
-                <a:spcPts val="1600"/>
-              </a:spcAft>
-              <a:buClr>
-                <a:schemeClr val="dk2"/>
-              </a:buClr>
-              <a:buNone/>
-              <a:defRPr sz="3733" b="0" i="0" u="none" strike="noStrike" cap="none" baseline="0">
-                <a:solidFill>
-                  <a:schemeClr val="dk2"/>
-                </a:solidFill>
-                <a:latin typeface="Arial"/>
-                <a:ea typeface="Arial"/>
-                <a:cs typeface="Arial"/>
-                <a:sym typeface="Arial"/>
-              </a:defRPr>
-            </a:lvl3pPr>
-            <a:lvl4pPr marR="0" algn="l" rtl="0">
-              <a:lnSpc>
-                <a:spcPct val="115000"/>
-              </a:lnSpc>
-              <a:spcBef>
-                <a:spcPts val="0"/>
-              </a:spcBef>
-              <a:spcAft>
-                <a:spcPts val="1600"/>
-              </a:spcAft>
-              <a:buClr>
-                <a:schemeClr val="dk2"/>
-              </a:buClr>
-              <a:buNone/>
-              <a:defRPr sz="3733" b="0" i="0" u="none" strike="noStrike" cap="none" baseline="0">
-                <a:solidFill>
-                  <a:schemeClr val="dk2"/>
-                </a:solidFill>
-                <a:latin typeface="Arial"/>
-                <a:ea typeface="Arial"/>
-                <a:cs typeface="Arial"/>
-                <a:sym typeface="Arial"/>
-              </a:defRPr>
-            </a:lvl4pPr>
-            <a:lvl5pPr marR="0" algn="l" rtl="0">
-              <a:lnSpc>
-                <a:spcPct val="115000"/>
-              </a:lnSpc>
-              <a:spcBef>
-                <a:spcPts val="0"/>
-              </a:spcBef>
-              <a:spcAft>
-                <a:spcPts val="1600"/>
-              </a:spcAft>
-              <a:buClr>
-                <a:schemeClr val="dk2"/>
-              </a:buClr>
-              <a:buNone/>
-              <a:defRPr sz="3733" b="0" i="0" u="none" strike="noStrike" cap="none" baseline="0">
-                <a:solidFill>
-                  <a:schemeClr val="dk2"/>
-                </a:solidFill>
-                <a:latin typeface="Arial"/>
-                <a:ea typeface="Arial"/>
-                <a:cs typeface="Arial"/>
-                <a:sym typeface="Arial"/>
-              </a:defRPr>
-            </a:lvl5pPr>
-            <a:lvl6pPr marR="0" algn="l" rtl="0">
-              <a:lnSpc>
-                <a:spcPct val="115000"/>
-              </a:lnSpc>
-              <a:spcBef>
-                <a:spcPts val="0"/>
-              </a:spcBef>
-              <a:spcAft>
-                <a:spcPts val="1600"/>
-              </a:spcAft>
-              <a:buClr>
-                <a:schemeClr val="dk2"/>
-              </a:buClr>
-              <a:buNone/>
-              <a:defRPr sz="3733" b="0" i="0" u="none" strike="noStrike" cap="none" baseline="0">
-                <a:solidFill>
-                  <a:schemeClr val="dk2"/>
-                </a:solidFill>
-                <a:latin typeface="Arial"/>
-                <a:ea typeface="Arial"/>
-                <a:cs typeface="Arial"/>
-                <a:sym typeface="Arial"/>
-              </a:defRPr>
-            </a:lvl6pPr>
-            <a:lvl7pPr marR="0" algn="l" rtl="0">
-              <a:lnSpc>
-                <a:spcPct val="115000"/>
-              </a:lnSpc>
-              <a:spcBef>
-                <a:spcPts val="0"/>
-              </a:spcBef>
-              <a:spcAft>
-                <a:spcPts val="1600"/>
-              </a:spcAft>
-              <a:buClr>
-                <a:schemeClr val="dk2"/>
-              </a:buClr>
-              <a:buNone/>
-              <a:defRPr sz="3733" b="0" i="0" u="none" strike="noStrike" cap="none" baseline="0">
-                <a:solidFill>
-                  <a:schemeClr val="dk2"/>
-                </a:solidFill>
-                <a:latin typeface="Arial"/>
-                <a:ea typeface="Arial"/>
-                <a:cs typeface="Arial"/>
-                <a:sym typeface="Arial"/>
-              </a:defRPr>
-            </a:lvl7pPr>
-            <a:lvl8pPr marR="0" algn="l" rtl="0">
-              <a:lnSpc>
-                <a:spcPct val="115000"/>
-              </a:lnSpc>
-              <a:spcBef>
-                <a:spcPts val="0"/>
-              </a:spcBef>
-              <a:spcAft>
-                <a:spcPts val="1600"/>
-              </a:spcAft>
-              <a:buClr>
-                <a:schemeClr val="dk2"/>
-              </a:buClr>
-              <a:buNone/>
-              <a:defRPr sz="3733" b="0" i="0" u="none" strike="noStrike" cap="none" baseline="0">
-                <a:solidFill>
-                  <a:schemeClr val="dk2"/>
-                </a:solidFill>
-                <a:latin typeface="Arial"/>
-                <a:ea typeface="Arial"/>
-                <a:cs typeface="Arial"/>
-                <a:sym typeface="Arial"/>
-              </a:defRPr>
-            </a:lvl8pPr>
-            <a:lvl9pPr marR="0" algn="l" rtl="0">
-              <a:lnSpc>
-                <a:spcPct val="115000"/>
-              </a:lnSpc>
-              <a:spcBef>
-                <a:spcPts val="0"/>
-              </a:spcBef>
-              <a:spcAft>
-                <a:spcPts val="1600"/>
-              </a:spcAft>
-              <a:buClr>
-                <a:schemeClr val="dk2"/>
-              </a:buClr>
-              <a:buNone/>
-              <a:defRPr sz="3733" b="0" i="0" u="none" strike="noStrike" cap="none" baseline="0">
-                <a:solidFill>
-                  <a:schemeClr val="dk2"/>
-                </a:solidFill>
-                <a:latin typeface="Arial"/>
-                <a:ea typeface="Arial"/>
-                <a:cs typeface="Arial"/>
-                <a:sym typeface="Arial"/>
-              </a:defRPr>
-            </a:lvl9pPr>
-          </a:lstStyle>
-          <a:p>
-            <a:endParaRPr lang="ru-RU" dirty="0">
-              <a:solidFill>
-                <a:schemeClr val="bg1">
-                  <a:lumMod val="95000"/>
-                </a:schemeClr>
-              </a:solidFill>
-            </a:endParaRPr>
-          </a:p>
-        </p:txBody>
-      </p:sp>
-      <p:pic>
-        <p:nvPicPr>
-          <p:cNvPr id="23" name="Picture 22">
-            <a:extLst>
-              <a:ext uri="{FF2B5EF4-FFF2-40B4-BE49-F238E27FC236}">
-                <a16:creationId xmlns:a16="http://schemas.microsoft.com/office/drawing/2014/main" id="{C8ECC730-045A-0EAC-0A65-262C7CFFFD64}"/>
-              </a:ext>
-            </a:extLst>
-          </p:cNvPr>
-          <p:cNvPicPr>
-            <a:picLocks noChangeAspect="1"/>
-          </p:cNvPicPr>
-          <p:nvPr/>
-        </p:nvPicPr>
-        <p:blipFill>
-          <a:blip r:embed="rId2"/>
-          <a:stretch>
-            <a:fillRect/>
-          </a:stretch>
-        </p:blipFill>
-        <p:spPr>
-          <a:xfrm>
-            <a:off x="1659578" y="8653284"/>
-            <a:ext cx="9631689" cy="4932338"/>
+            <a:off x="1860126" y="4623521"/>
+            <a:ext cx="21080679" cy="8027331"/>
           </a:xfrm>
           <a:prstGeom prst="rect">
             <a:avLst/>
@@ -9577,10 +10235,10 @@
       </p:pic>
       <p:sp>
         <p:nvSpPr>
-          <p:cNvPr id="25" name="Text Placeholder 24">
+          <p:cNvPr id="6" name="Text Placeholder 5">
             <a:extLst>
               <a:ext uri="{FF2B5EF4-FFF2-40B4-BE49-F238E27FC236}">
-                <a16:creationId xmlns:a16="http://schemas.microsoft.com/office/drawing/2014/main" id="{59270C2B-F531-57F6-B66B-8630309E56F6}"/>
+                <a16:creationId xmlns:a16="http://schemas.microsoft.com/office/drawing/2014/main" id="{AE2D9366-2424-A843-654F-9863D8632F60}"/>
               </a:ext>
             </a:extLst>
           </p:cNvPr>
@@ -9588,209 +10246,19 @@
             <a:spLocks noGrp="1"/>
           </p:cNvSpPr>
           <p:nvPr>
-            <p:ph type="body" idx="15"/>
+            <p:ph type="body" idx="14"/>
           </p:nvPr>
         </p:nvSpPr>
-        <p:spPr>
-          <a:xfrm>
-            <a:off x="12371387" y="2982549"/>
-            <a:ext cx="7632848" cy="8136904"/>
-          </a:xfrm>
-        </p:spPr>
+        <p:spPr/>
         <p:txBody>
           <a:bodyPr/>
           <a:lstStyle/>
           <a:p>
-            <a:pPr algn="l"/>
-            <a:endParaRPr lang="ru-RU" b="1" dirty="0">
-              <a:solidFill>
-                <a:srgbClr val="525252"/>
-              </a:solidFill>
-              <a:latin typeface="Arial" panose="020B0604020202020204" pitchFamily="34" charset="0"/>
-              <a:cs typeface="Arial" panose="020B0604020202020204" pitchFamily="34" charset="0"/>
-            </a:endParaRPr>
-          </a:p>
-          <a:p>
-            <a:pPr algn="l"/>
-            <a:endParaRPr lang="ru-RU" b="1" dirty="0">
-              <a:solidFill>
-                <a:srgbClr val="525252"/>
-              </a:solidFill>
-              <a:latin typeface="Arial" panose="020B0604020202020204" pitchFamily="34" charset="0"/>
-              <a:cs typeface="Arial" panose="020B0604020202020204" pitchFamily="34" charset="0"/>
-            </a:endParaRPr>
-          </a:p>
-          <a:p>
-            <a:pPr algn="l"/>
-            <a:r>
-              <a:rPr lang="en-US" b="1" dirty="0" err="1">
-                <a:solidFill>
-                  <a:srgbClr val="525252"/>
-                </a:solidFill>
-              </a:rPr>
-              <a:t>annot</a:t>
-            </a:r>
-            <a:r>
-              <a:rPr lang="en-US" b="1" dirty="0">
-                <a:solidFill>
-                  <a:srgbClr val="525252"/>
-                </a:solidFill>
-              </a:rPr>
-              <a:t>.</a:t>
-            </a:r>
-            <a:r>
-              <a:rPr lang="ru-RU" b="1" i="0" u="none" strike="noStrike" dirty="0">
-                <a:solidFill>
-                  <a:srgbClr val="525252"/>
-                </a:solidFill>
-                <a:effectLst/>
-              </a:rPr>
-              <a:t> </a:t>
-            </a:r>
-            <a:r>
-              <a:rPr lang="ru-RU" b="0" i="0" u="none" strike="noStrike" dirty="0">
-                <a:solidFill>
-                  <a:srgbClr val="525252"/>
-                </a:solidFill>
-                <a:effectLst/>
-              </a:rPr>
-              <a:t>— это </a:t>
-            </a:r>
-            <a:r>
-              <a:rPr lang="ru-RU" b="1" i="0" u="none" strike="noStrike" dirty="0">
-                <a:solidFill>
-                  <a:srgbClr val="525252"/>
-                </a:solidFill>
-                <a:effectLst/>
-              </a:rPr>
-              <a:t>облегчённый пользовательский диалект</a:t>
-            </a:r>
-            <a:r>
-              <a:rPr lang="ru-RU" b="0" i="0" u="none" strike="noStrike" dirty="0">
-                <a:solidFill>
-                  <a:srgbClr val="525252"/>
-                </a:solidFill>
-                <a:effectLst/>
-              </a:rPr>
-              <a:t>, который:</a:t>
-            </a:r>
-          </a:p>
-          <a:p>
-            <a:pPr marL="457200" indent="-457200" algn="l">
-              <a:buClr>
-                <a:srgbClr val="0072BC"/>
-              </a:buClr>
-              <a:buFont typeface="Arial" panose="020B0604020202020204" pitchFamily="34" charset="0"/>
-              <a:buChar char="•"/>
-            </a:pPr>
-            <a:r>
-              <a:rPr lang="ru-RU" b="0" i="0" u="none" strike="noStrike" dirty="0">
-                <a:solidFill>
-                  <a:srgbClr val="525252"/>
-                </a:solidFill>
-                <a:effectLst/>
-              </a:rPr>
-              <a:t>Не требует переопределения логики операций,</a:t>
-            </a:r>
-          </a:p>
-          <a:p>
-            <a:pPr marL="457200" indent="-457200">
-              <a:buClr>
-                <a:srgbClr val="0072BC"/>
-              </a:buClr>
-              <a:buFont typeface="Arial" panose="020B0604020202020204" pitchFamily="34" charset="0"/>
-              <a:buChar char="•"/>
-            </a:pPr>
-            <a:r>
-              <a:rPr lang="ru-RU" sz="3200" dirty="0">
-                <a:solidFill>
-                  <a:srgbClr val="525252"/>
-                </a:solidFill>
-                <a:latin typeface="+mn-lt"/>
-              </a:rPr>
-              <a:t>Сохраняет стандартные диалекты при понижении (</a:t>
-            </a:r>
-            <a:r>
-              <a:rPr lang="en-US" sz="3200" dirty="0">
-                <a:solidFill>
-                  <a:srgbClr val="525252"/>
-                </a:solidFill>
-                <a:latin typeface="+mn-lt"/>
-              </a:rPr>
-              <a:t>lowering)</a:t>
-            </a:r>
-          </a:p>
-          <a:p>
-            <a:pPr marL="457200" indent="-457200">
-              <a:buClr>
-                <a:srgbClr val="0072BC"/>
-              </a:buClr>
-              <a:buFont typeface="Arial" panose="020B0604020202020204" pitchFamily="34" charset="0"/>
-              <a:buChar char="•"/>
-            </a:pPr>
-            <a:r>
-              <a:rPr lang="ru-RU" sz="3200" dirty="0">
-                <a:latin typeface="+mn-lt"/>
-              </a:rPr>
-              <a:t>Добавляет структурированный синтаксис для аннотаций с валидацией</a:t>
-            </a:r>
-          </a:p>
-          <a:p>
-            <a:pPr marL="457200" indent="-457200">
-              <a:buClr>
-                <a:srgbClr val="0072BC"/>
-              </a:buClr>
-              <a:buFont typeface="Arial" panose="020B0604020202020204" pitchFamily="34" charset="0"/>
-              <a:buChar char="•"/>
-            </a:pPr>
-            <a:r>
-              <a:rPr lang="ru-RU" sz="3200" dirty="0">
-                <a:latin typeface="+mn-lt"/>
-              </a:rPr>
-              <a:t>Позволяет очистить или понизить аннотации в отдельном проходе</a:t>
-            </a:r>
-          </a:p>
-          <a:p>
             <a:endParaRPr lang="en-US" dirty="0"/>
           </a:p>
         </p:txBody>
       </p:sp>
-      <p:pic>
-        <p:nvPicPr>
-          <p:cNvPr id="27" name="Picture 26">
-            <a:extLst>
-              <a:ext uri="{FF2B5EF4-FFF2-40B4-BE49-F238E27FC236}">
-                <a16:creationId xmlns:a16="http://schemas.microsoft.com/office/drawing/2014/main" id="{8EEFE180-3890-4146-E657-F15D2E16473C}"/>
-              </a:ext>
-            </a:extLst>
-          </p:cNvPr>
-          <p:cNvPicPr>
-            <a:picLocks noChangeAspect="1"/>
-          </p:cNvPicPr>
-          <p:nvPr/>
-        </p:nvPicPr>
-        <p:blipFill>
-          <a:blip r:embed="rId3"/>
-          <a:stretch>
-            <a:fillRect/>
-          </a:stretch>
-        </p:blipFill>
-        <p:spPr>
-          <a:xfrm>
-            <a:off x="1820768" y="2225218"/>
-            <a:ext cx="9311047" cy="6913189"/>
-          </a:xfrm>
-          <a:prstGeom prst="rect">
-            <a:avLst/>
-          </a:prstGeom>
-        </p:spPr>
-      </p:pic>
     </p:spTree>
-    <p:extLst>
-      <p:ext uri="{BB962C8B-B14F-4D97-AF65-F5344CB8AC3E}">
-        <p14:creationId xmlns:p14="http://schemas.microsoft.com/office/powerpoint/2010/main" val="1819217759"/>
-      </p:ext>
-    </p:extLst>
   </p:cSld>
   <p:clrMapOvr>
     <a:masterClrMapping/>
@@ -9831,643 +10299,9 @@
           <a:lstStyle/>
           <a:p>
             <a:r>
-              <a:rPr lang="ru" sz="9600" dirty="0"/>
-              <a:t>Подробное описание архитектуры</a:t>
+              <a:rPr lang="ru-RU" dirty="0"/>
+              <a:t>Постановка задач</a:t>
             </a:r>
-            <a:br>
-              <a:rPr lang="ru" sz="2400" dirty="0"/>
-            </a:br>
-            <a:endParaRPr lang="ru-RU" dirty="0"/>
-          </a:p>
-        </p:txBody>
-      </p:sp>
-      <p:sp>
-        <p:nvSpPr>
-          <p:cNvPr id="3" name="Текст 2"/>
-          <p:cNvSpPr>
-            <a:spLocks noGrp="1"/>
-          </p:cNvSpPr>
-          <p:nvPr>
-            <p:ph type="body" idx="1"/>
-          </p:nvPr>
-        </p:nvSpPr>
-        <p:spPr>
-          <a:xfrm>
-            <a:off x="13618394" y="3689648"/>
-            <a:ext cx="10791982" cy="8187399"/>
-          </a:xfrm>
-        </p:spPr>
-        <p:txBody>
-          <a:bodyPr/>
-          <a:lstStyle/>
-          <a:p>
-            <a:pPr marL="342900" marR="0" lvl="0" indent="-342900">
-              <a:spcBef>
-                <a:spcPts val="0"/>
-              </a:spcBef>
-              <a:spcAft>
-                <a:spcPts val="0"/>
-              </a:spcAft>
-              <a:buSzPts val="1000"/>
-              <a:buFont typeface="+mj-lt"/>
-              <a:buAutoNum type="arabicPeriod"/>
-              <a:tabLst>
-                <a:tab pos="457200" algn="l"/>
-              </a:tabLst>
-            </a:pPr>
-            <a:endParaRPr lang="en-US" sz="1800" dirty="0">
-              <a:solidFill>
-                <a:srgbClr val="000000"/>
-              </a:solidFill>
-              <a:latin typeface="Times New Roman" panose="02020603050405020304" pitchFamily="18" charset="0"/>
-              <a:ea typeface="Times New Roman" panose="02020603050405020304" pitchFamily="18" charset="0"/>
-              <a:cs typeface="Times New Roman" panose="02020603050405020304" pitchFamily="18" charset="0"/>
-            </a:endParaRPr>
-          </a:p>
-          <a:p>
-            <a:pPr marR="0" lvl="0">
-              <a:spcBef>
-                <a:spcPts val="0"/>
-              </a:spcBef>
-              <a:spcAft>
-                <a:spcPts val="0"/>
-              </a:spcAft>
-              <a:buSzPts val="1000"/>
-              <a:tabLst>
-                <a:tab pos="457200" algn="l"/>
-              </a:tabLst>
-            </a:pPr>
-            <a:r>
-              <a:rPr lang="ru-RU" dirty="0">
-                <a:solidFill>
-                  <a:srgbClr val="3E3E3E"/>
-                </a:solidFill>
-                <a:latin typeface="Arial" panose="020B0604020202020204" pitchFamily="34" charset="0"/>
-                <a:ea typeface="Times New Roman" panose="02020603050405020304" pitchFamily="18" charset="0"/>
-                <a:cs typeface="Arial" panose="020B0604020202020204" pitchFamily="34" charset="0"/>
-              </a:rPr>
-              <a:t>Описание</a:t>
-            </a:r>
-            <a:r>
-              <a:rPr lang="en-US" dirty="0">
-                <a:solidFill>
-                  <a:srgbClr val="3E3E3E"/>
-                </a:solidFill>
-                <a:latin typeface="Arial" panose="020B0604020202020204" pitchFamily="34" charset="0"/>
-                <a:ea typeface="Times New Roman" panose="02020603050405020304" pitchFamily="18" charset="0"/>
-                <a:cs typeface="Arial" panose="020B0604020202020204" pitchFamily="34" charset="0"/>
-              </a:rPr>
-              <a:t>:</a:t>
-            </a:r>
-          </a:p>
-          <a:p>
-            <a:pPr marL="342900" marR="0" lvl="0" indent="-342900">
-              <a:spcBef>
-                <a:spcPts val="0"/>
-              </a:spcBef>
-              <a:spcAft>
-                <a:spcPts val="0"/>
-              </a:spcAft>
-              <a:buSzPts val="1000"/>
-              <a:buFont typeface="+mj-lt"/>
-              <a:buAutoNum type="arabicPeriod"/>
-              <a:tabLst>
-                <a:tab pos="457200" algn="l"/>
-              </a:tabLst>
-            </a:pPr>
-            <a:endParaRPr lang="en-US" sz="1800" dirty="0">
-              <a:solidFill>
-                <a:srgbClr val="000000"/>
-              </a:solidFill>
-              <a:latin typeface="Times New Roman" panose="02020603050405020304" pitchFamily="18" charset="0"/>
-              <a:ea typeface="Times New Roman" panose="02020603050405020304" pitchFamily="18" charset="0"/>
-              <a:cs typeface="Times New Roman" panose="02020603050405020304" pitchFamily="18" charset="0"/>
-            </a:endParaRPr>
-          </a:p>
-          <a:p>
-            <a:pPr marL="342900" marR="0" lvl="0" indent="-342900">
-              <a:spcBef>
-                <a:spcPts val="0"/>
-              </a:spcBef>
-              <a:spcAft>
-                <a:spcPts val="0"/>
-              </a:spcAft>
-              <a:buSzPts val="1000"/>
-              <a:buFont typeface="+mj-lt"/>
-              <a:buAutoNum type="arabicPeriod"/>
-              <a:tabLst>
-                <a:tab pos="457200" algn="l"/>
-              </a:tabLst>
-            </a:pPr>
-            <a:endParaRPr lang="en-US" sz="1800" dirty="0">
-              <a:solidFill>
-                <a:srgbClr val="000000"/>
-              </a:solidFill>
-              <a:latin typeface="Times New Roman" panose="02020603050405020304" pitchFamily="18" charset="0"/>
-              <a:ea typeface="Times New Roman" panose="02020603050405020304" pitchFamily="18" charset="0"/>
-              <a:cs typeface="Times New Roman" panose="02020603050405020304" pitchFamily="18" charset="0"/>
-            </a:endParaRPr>
-          </a:p>
-          <a:p>
-            <a:pPr marL="514350" marR="0" lvl="0" indent="-514350">
-              <a:spcBef>
-                <a:spcPts val="0"/>
-              </a:spcBef>
-              <a:spcAft>
-                <a:spcPts val="0"/>
-              </a:spcAft>
-              <a:buClr>
-                <a:srgbClr val="0072BC"/>
-              </a:buClr>
-              <a:buFont typeface="+mj-lt"/>
-              <a:buAutoNum type="arabicPeriod"/>
-              <a:tabLst>
-                <a:tab pos="457200" algn="l"/>
-              </a:tabLst>
-            </a:pPr>
-            <a:r>
-              <a:rPr lang="en-US" dirty="0">
-                <a:solidFill>
-                  <a:srgbClr val="525252"/>
-                </a:solidFill>
-                <a:ea typeface="Times New Roman" panose="02020603050405020304" pitchFamily="18" charset="0"/>
-                <a:cs typeface="Times New Roman" panose="02020603050405020304" pitchFamily="18" charset="0"/>
-              </a:rPr>
-              <a:t>C</a:t>
-            </a:r>
-            <a:r>
-              <a:rPr lang="ru-RU" kern="0" dirty="0">
-                <a:solidFill>
-                  <a:srgbClr val="525252"/>
-                </a:solidFill>
-                <a:effectLst/>
-                <a:ea typeface="Times New Roman" panose="02020603050405020304" pitchFamily="18" charset="0"/>
-                <a:cs typeface="Times New Roman" panose="02020603050405020304" pitchFamily="18" charset="0"/>
-              </a:rPr>
-              <a:t>обираем профиль с помощью внешнего инструмента, например, </a:t>
-            </a:r>
-            <a:r>
-              <a:rPr lang="en-US" kern="0" dirty="0">
-                <a:solidFill>
-                  <a:srgbClr val="525252"/>
-                </a:solidFill>
-                <a:effectLst/>
-                <a:ea typeface="Times New Roman" panose="02020603050405020304" pitchFamily="18" charset="0"/>
-                <a:cs typeface="Times New Roman" panose="02020603050405020304" pitchFamily="18" charset="0"/>
-              </a:rPr>
-              <a:t>TensorFlow Profiler,</a:t>
-            </a:r>
-            <a:endParaRPr lang="en-US" kern="100" dirty="0">
-              <a:solidFill>
-                <a:srgbClr val="525252"/>
-              </a:solidFill>
-              <a:effectLst/>
-              <a:ea typeface="Calibri" panose="020F0502020204030204" pitchFamily="34" charset="0"/>
-              <a:cs typeface="Times New Roman" panose="02020603050405020304" pitchFamily="18" charset="0"/>
-            </a:endParaRPr>
-          </a:p>
-          <a:p>
-            <a:pPr marL="514350" marR="0" lvl="0" indent="-514350">
-              <a:spcBef>
-                <a:spcPts val="0"/>
-              </a:spcBef>
-              <a:spcAft>
-                <a:spcPts val="0"/>
-              </a:spcAft>
-              <a:buClr>
-                <a:srgbClr val="0072BC"/>
-              </a:buClr>
-              <a:buFont typeface="+mj-lt"/>
-              <a:buAutoNum type="arabicPeriod"/>
-              <a:tabLst>
-                <a:tab pos="457200" algn="l"/>
-              </a:tabLst>
-            </a:pPr>
-            <a:r>
-              <a:rPr lang="en-US" kern="0" dirty="0">
-                <a:solidFill>
-                  <a:srgbClr val="525252"/>
-                </a:solidFill>
-                <a:effectLst/>
-                <a:ea typeface="Times New Roman" panose="02020603050405020304" pitchFamily="18" charset="0"/>
-                <a:cs typeface="Times New Roman" panose="02020603050405020304" pitchFamily="18" charset="0"/>
-              </a:rPr>
-              <a:t>Данные </a:t>
-            </a:r>
-            <a:r>
-              <a:rPr lang="en-US" kern="0" dirty="0" err="1">
-                <a:solidFill>
-                  <a:srgbClr val="525252"/>
-                </a:solidFill>
-                <a:effectLst/>
-                <a:ea typeface="Times New Roman" panose="02020603050405020304" pitchFamily="18" charset="0"/>
-                <a:cs typeface="Times New Roman" panose="02020603050405020304" pitchFamily="18" charset="0"/>
-              </a:rPr>
-              <a:t>сохраняются</a:t>
-            </a:r>
-            <a:r>
-              <a:rPr lang="en-US" kern="0" dirty="0">
-                <a:solidFill>
-                  <a:srgbClr val="525252"/>
-                </a:solidFill>
-                <a:effectLst/>
-                <a:ea typeface="Times New Roman" panose="02020603050405020304" pitchFamily="18" charset="0"/>
-                <a:cs typeface="Times New Roman" panose="02020603050405020304" pitchFamily="18" charset="0"/>
-              </a:rPr>
-              <a:t> </a:t>
-            </a:r>
-            <a:r>
-              <a:rPr lang="en-US" kern="0" dirty="0" err="1">
-                <a:solidFill>
-                  <a:srgbClr val="525252"/>
-                </a:solidFill>
-                <a:effectLst/>
-                <a:ea typeface="Times New Roman" panose="02020603050405020304" pitchFamily="18" charset="0"/>
-                <a:cs typeface="Times New Roman" panose="02020603050405020304" pitchFamily="18" charset="0"/>
-              </a:rPr>
-              <a:t>в</a:t>
-            </a:r>
-            <a:r>
-              <a:rPr lang="en-US" kern="0" dirty="0">
-                <a:solidFill>
-                  <a:srgbClr val="525252"/>
-                </a:solidFill>
-                <a:effectLst/>
-                <a:ea typeface="Times New Roman" panose="02020603050405020304" pitchFamily="18" charset="0"/>
-                <a:cs typeface="Times New Roman" panose="02020603050405020304" pitchFamily="18" charset="0"/>
-              </a:rPr>
-              <a:t> YAML-</a:t>
-            </a:r>
-            <a:r>
-              <a:rPr lang="en-US" kern="0" dirty="0" err="1">
-                <a:solidFill>
-                  <a:srgbClr val="525252"/>
-                </a:solidFill>
-                <a:effectLst/>
-                <a:ea typeface="Times New Roman" panose="02020603050405020304" pitchFamily="18" charset="0"/>
-                <a:cs typeface="Times New Roman" panose="02020603050405020304" pitchFamily="18" charset="0"/>
-              </a:rPr>
-              <a:t>формате</a:t>
-            </a:r>
-            <a:r>
-              <a:rPr lang="en-US" kern="0" dirty="0">
-                <a:solidFill>
-                  <a:srgbClr val="525252"/>
-                </a:solidFill>
-                <a:effectLst/>
-                <a:ea typeface="Times New Roman" panose="02020603050405020304" pitchFamily="18" charset="0"/>
-                <a:cs typeface="Times New Roman" panose="02020603050405020304" pitchFamily="18" charset="0"/>
-              </a:rPr>
-              <a:t>,</a:t>
-            </a:r>
-            <a:endParaRPr lang="en-US" kern="100" dirty="0">
-              <a:solidFill>
-                <a:srgbClr val="525252"/>
-              </a:solidFill>
-              <a:effectLst/>
-              <a:ea typeface="Calibri" panose="020F0502020204030204" pitchFamily="34" charset="0"/>
-              <a:cs typeface="Times New Roman" panose="02020603050405020304" pitchFamily="18" charset="0"/>
-            </a:endParaRPr>
-          </a:p>
-          <a:p>
-            <a:pPr marL="514350" marR="0" lvl="0" indent="-514350">
-              <a:spcBef>
-                <a:spcPts val="0"/>
-              </a:spcBef>
-              <a:spcAft>
-                <a:spcPts val="0"/>
-              </a:spcAft>
-              <a:buClr>
-                <a:srgbClr val="0072BC"/>
-              </a:buClr>
-              <a:buFont typeface="+mj-lt"/>
-              <a:buAutoNum type="arabicPeriod"/>
-              <a:tabLst>
-                <a:tab pos="457200" algn="l"/>
-              </a:tabLst>
-            </a:pPr>
-            <a:r>
-              <a:rPr lang="ru-RU" kern="0" dirty="0">
-                <a:solidFill>
-                  <a:srgbClr val="525252"/>
-                </a:solidFill>
-                <a:effectLst/>
-                <a:ea typeface="Times New Roman" panose="02020603050405020304" pitchFamily="18" charset="0"/>
-                <a:cs typeface="Times New Roman" panose="02020603050405020304" pitchFamily="18" charset="0"/>
-              </a:rPr>
-              <a:t>Инструмент считывает </a:t>
-            </a:r>
-            <a:r>
-              <a:rPr lang="en-US" kern="0" dirty="0">
-                <a:solidFill>
-                  <a:srgbClr val="525252"/>
-                </a:solidFill>
-                <a:effectLst/>
-                <a:ea typeface="Times New Roman" panose="02020603050405020304" pitchFamily="18" charset="0"/>
-                <a:cs typeface="Times New Roman" panose="02020603050405020304" pitchFamily="18" charset="0"/>
-              </a:rPr>
-              <a:t>YAML</a:t>
-            </a:r>
-            <a:r>
-              <a:rPr lang="ru-RU" kern="0" dirty="0">
-                <a:solidFill>
-                  <a:srgbClr val="525252"/>
-                </a:solidFill>
-                <a:effectLst/>
-                <a:ea typeface="Times New Roman" panose="02020603050405020304" pitchFamily="18" charset="0"/>
-                <a:cs typeface="Times New Roman" panose="02020603050405020304" pitchFamily="18" charset="0"/>
-              </a:rPr>
-              <a:t> и вставляет аннотации в </a:t>
-            </a:r>
-            <a:r>
-              <a:rPr lang="en-US" kern="0" dirty="0">
-                <a:solidFill>
-                  <a:srgbClr val="525252"/>
-                </a:solidFill>
-                <a:effectLst/>
-                <a:ea typeface="Times New Roman" panose="02020603050405020304" pitchFamily="18" charset="0"/>
-                <a:cs typeface="Times New Roman" panose="02020603050405020304" pitchFamily="18" charset="0"/>
-              </a:rPr>
-              <a:t>MLIR,</a:t>
-            </a:r>
-            <a:endParaRPr lang="en-US" kern="100" dirty="0">
-              <a:solidFill>
-                <a:srgbClr val="525252"/>
-              </a:solidFill>
-              <a:effectLst/>
-              <a:ea typeface="Calibri" panose="020F0502020204030204" pitchFamily="34" charset="0"/>
-              <a:cs typeface="Times New Roman" panose="02020603050405020304" pitchFamily="18" charset="0"/>
-            </a:endParaRPr>
-          </a:p>
-          <a:p>
-            <a:pPr marL="514350" marR="0" lvl="0" indent="-514350">
-              <a:spcBef>
-                <a:spcPts val="0"/>
-              </a:spcBef>
-              <a:spcAft>
-                <a:spcPts val="0"/>
-              </a:spcAft>
-              <a:buClr>
-                <a:srgbClr val="0072BC"/>
-              </a:buClr>
-              <a:buFont typeface="+mj-lt"/>
-              <a:buAutoNum type="arabicPeriod"/>
-              <a:tabLst>
-                <a:tab pos="457200" algn="l"/>
-              </a:tabLst>
-            </a:pPr>
-            <a:r>
-              <a:rPr lang="ru-RU" kern="0" dirty="0">
-                <a:solidFill>
-                  <a:srgbClr val="525252"/>
-                </a:solidFill>
-                <a:effectLst/>
-                <a:ea typeface="Times New Roman" panose="02020603050405020304" pitchFamily="18" charset="0"/>
-                <a:cs typeface="Times New Roman" panose="02020603050405020304" pitchFamily="18" charset="0"/>
-              </a:rPr>
-              <a:t>Затем проходят компиляторные преобразования, использующие эти аннотации</a:t>
-            </a:r>
-            <a:r>
-              <a:rPr lang="en-US" kern="0" dirty="0">
-                <a:solidFill>
-                  <a:srgbClr val="525252"/>
-                </a:solidFill>
-                <a:effectLst/>
-                <a:ea typeface="Times New Roman" panose="02020603050405020304" pitchFamily="18" charset="0"/>
-                <a:cs typeface="Times New Roman" panose="02020603050405020304" pitchFamily="18" charset="0"/>
-              </a:rPr>
-              <a:t>.</a:t>
-            </a:r>
-            <a:endParaRPr lang="en-US" kern="100" dirty="0">
-              <a:solidFill>
-                <a:srgbClr val="525252"/>
-              </a:solidFill>
-              <a:effectLst/>
-              <a:ea typeface="Calibri" panose="020F0502020204030204" pitchFamily="34" charset="0"/>
-              <a:cs typeface="Times New Roman" panose="02020603050405020304" pitchFamily="18" charset="0"/>
-            </a:endParaRPr>
-          </a:p>
-          <a:p>
-            <a:endParaRPr lang="en-US" dirty="0">
-              <a:solidFill>
-                <a:schemeClr val="accent3">
-                  <a:lumMod val="75000"/>
-                </a:schemeClr>
-              </a:solidFill>
-            </a:endParaRPr>
-          </a:p>
-          <a:p>
-            <a:r>
-              <a:rPr lang="ru-RU" dirty="0">
-                <a:solidFill>
-                  <a:srgbClr val="3E3E3E"/>
-                </a:solidFill>
-              </a:rPr>
-              <a:t>Преимущества</a:t>
-            </a:r>
-            <a:r>
-              <a:rPr lang="en-US" dirty="0">
-                <a:solidFill>
-                  <a:schemeClr val="accent3">
-                    <a:lumMod val="75000"/>
-                  </a:schemeClr>
-                </a:solidFill>
-              </a:rPr>
-              <a:t>:</a:t>
-            </a:r>
-          </a:p>
-          <a:p>
-            <a:pPr marL="457200" indent="-457200">
-              <a:buClr>
-                <a:srgbClr val="0072BC"/>
-              </a:buClr>
-              <a:buFont typeface="Arial" panose="020B0604020202020204" pitchFamily="34" charset="0"/>
-              <a:buChar char="•"/>
-            </a:pPr>
-            <a:r>
-              <a:rPr lang="ru-RU" dirty="0">
-                <a:solidFill>
-                  <a:schemeClr val="accent3">
-                    <a:lumMod val="75000"/>
-                  </a:schemeClr>
-                </a:solidFill>
-              </a:rPr>
-              <a:t>Добавление новых метаданных</a:t>
-            </a:r>
-            <a:r>
-              <a:rPr lang="en-US" dirty="0">
-                <a:solidFill>
-                  <a:schemeClr val="accent3">
-                    <a:lumMod val="75000"/>
-                  </a:schemeClr>
-                </a:solidFill>
-              </a:rPr>
-              <a:t>, </a:t>
-            </a:r>
-            <a:endParaRPr lang="ru-RU" dirty="0">
-              <a:solidFill>
-                <a:schemeClr val="accent3">
-                  <a:lumMod val="75000"/>
-                </a:schemeClr>
-              </a:solidFill>
-            </a:endParaRPr>
-          </a:p>
-          <a:p>
-            <a:pPr marL="457200" indent="-457200">
-              <a:buClr>
-                <a:srgbClr val="0072BC"/>
-              </a:buClr>
-              <a:buFont typeface="Arial" panose="020B0604020202020204" pitchFamily="34" charset="0"/>
-              <a:buChar char="•"/>
-            </a:pPr>
-            <a:r>
-              <a:rPr lang="ru-RU" dirty="0">
-                <a:solidFill>
-                  <a:schemeClr val="accent3">
-                    <a:lumMod val="75000"/>
-                  </a:schemeClr>
-                </a:solidFill>
-              </a:rPr>
-              <a:t>Добавление новых диалектов</a:t>
-            </a:r>
-            <a:r>
-              <a:rPr lang="en-US" dirty="0">
-                <a:solidFill>
-                  <a:schemeClr val="accent3">
-                    <a:lumMod val="75000"/>
-                  </a:schemeClr>
-                </a:solidFill>
-              </a:rPr>
-              <a:t>, </a:t>
-            </a:r>
-            <a:endParaRPr lang="ru-RU" dirty="0">
-              <a:solidFill>
-                <a:schemeClr val="accent3">
-                  <a:lumMod val="75000"/>
-                </a:schemeClr>
-              </a:solidFill>
-            </a:endParaRPr>
-          </a:p>
-          <a:p>
-            <a:pPr marL="457200" indent="-457200">
-              <a:buClr>
-                <a:srgbClr val="0072BC"/>
-              </a:buClr>
-              <a:buFont typeface="Arial" panose="020B0604020202020204" pitchFamily="34" charset="0"/>
-              <a:buChar char="•"/>
-            </a:pPr>
-            <a:r>
-              <a:rPr lang="ru-RU" dirty="0">
-                <a:solidFill>
-                  <a:schemeClr val="accent3">
-                    <a:lumMod val="75000"/>
-                  </a:schemeClr>
-                </a:solidFill>
-              </a:rPr>
-              <a:t>Изменение/добавление правил трансформаций</a:t>
-            </a:r>
-            <a:r>
-              <a:rPr lang="en-US" dirty="0">
-                <a:solidFill>
-                  <a:schemeClr val="accent3">
-                    <a:lumMod val="75000"/>
-                  </a:schemeClr>
-                </a:solidFill>
-              </a:rPr>
-              <a:t>,</a:t>
-            </a:r>
-            <a:endParaRPr lang="ru-RU" dirty="0">
-              <a:solidFill>
-                <a:schemeClr val="accent3">
-                  <a:lumMod val="75000"/>
-                </a:schemeClr>
-              </a:solidFill>
-            </a:endParaRPr>
-          </a:p>
-          <a:p>
-            <a:pPr marL="457200" indent="-457200">
-              <a:buClr>
-                <a:srgbClr val="0072BC"/>
-              </a:buClr>
-              <a:buFont typeface="Arial" panose="020B0604020202020204" pitchFamily="34" charset="0"/>
-              <a:buChar char="•"/>
-            </a:pPr>
-            <a:r>
-              <a:rPr lang="ru-RU" dirty="0">
-                <a:solidFill>
-                  <a:schemeClr val="accent3">
-                    <a:lumMod val="75000"/>
-                  </a:schemeClr>
-                </a:solidFill>
-              </a:rPr>
-              <a:t>Возможность кастомизации инструментов визуализации</a:t>
-            </a:r>
-            <a:r>
-              <a:rPr lang="en-US" dirty="0">
-                <a:solidFill>
-                  <a:schemeClr val="accent3">
-                    <a:lumMod val="75000"/>
-                  </a:schemeClr>
-                </a:solidFill>
-              </a:rPr>
-              <a:t>.</a:t>
-            </a:r>
-            <a:endParaRPr lang="ru-RU" dirty="0">
-              <a:solidFill>
-                <a:schemeClr val="accent3">
-                  <a:lumMod val="75000"/>
-                </a:schemeClr>
-              </a:solidFill>
-            </a:endParaRPr>
-          </a:p>
-          <a:p>
-            <a:pPr marL="457200" indent="-457200">
-              <a:buClr>
-                <a:srgbClr val="0072BC"/>
-              </a:buClr>
-              <a:buFont typeface="Arial" panose="020B0604020202020204" pitchFamily="34" charset="0"/>
-              <a:buChar char="•"/>
-            </a:pPr>
-            <a:endParaRPr lang="en-US" dirty="0">
-              <a:solidFill>
-                <a:schemeClr val="accent3">
-                  <a:lumMod val="75000"/>
-                </a:schemeClr>
-              </a:solidFill>
-            </a:endParaRPr>
-          </a:p>
-          <a:p>
-            <a:r>
-              <a:rPr lang="en-US" dirty="0">
-                <a:effectLst/>
-              </a:rPr>
-              <a:t> </a:t>
-            </a:r>
-            <a:endParaRPr lang="en-US" dirty="0">
-              <a:solidFill>
-                <a:schemeClr val="accent3">
-                  <a:lumMod val="75000"/>
-                </a:schemeClr>
-              </a:solidFill>
-            </a:endParaRPr>
-          </a:p>
-          <a:p>
-            <a:endParaRPr lang="en-US" dirty="0">
-              <a:solidFill>
-                <a:schemeClr val="accent3">
-                  <a:lumMod val="75000"/>
-                </a:schemeClr>
-              </a:solidFill>
-            </a:endParaRPr>
-          </a:p>
-          <a:p>
-            <a:endParaRPr lang="ru-RU" dirty="0">
-              <a:solidFill>
-                <a:schemeClr val="accent3">
-                  <a:lumMod val="75000"/>
-                </a:schemeClr>
-              </a:solidFill>
-            </a:endParaRPr>
           </a:p>
         </p:txBody>
       </p:sp>
@@ -10495,40 +10329,491 @@
           </a:p>
         </p:txBody>
       </p:sp>
-      <p:pic>
-        <p:nvPicPr>
-          <p:cNvPr id="11" name="Picture 10">
-            <a:extLst>
-              <a:ext uri="{FF2B5EF4-FFF2-40B4-BE49-F238E27FC236}">
-                <a16:creationId xmlns:a16="http://schemas.microsoft.com/office/drawing/2014/main" id="{C45596BC-86B1-FA4F-25E5-8B211A959935}"/>
-              </a:ext>
-            </a:extLst>
-          </p:cNvPr>
-          <p:cNvPicPr>
-            <a:picLocks noChangeAspect="1"/>
-          </p:cNvPicPr>
-          <p:nvPr/>
-        </p:nvPicPr>
-        <p:blipFill>
-          <a:blip r:embed="rId2"/>
-          <a:stretch>
-            <a:fillRect/>
-          </a:stretch>
-        </p:blipFill>
+      <p:sp>
+        <p:nvSpPr>
+          <p:cNvPr id="6" name="Текст 5"/>
+          <p:cNvSpPr>
+            <a:spLocks noGrp="1"/>
+          </p:cNvSpPr>
+          <p:nvPr>
+            <p:ph type="body" idx="14"/>
+          </p:nvPr>
+        </p:nvSpPr>
         <p:spPr>
           <a:xfrm>
-            <a:off x="882469" y="3689648"/>
-            <a:ext cx="12385376" cy="9340144"/>
+            <a:off x="-1874195" y="7650088"/>
+            <a:ext cx="2455391" cy="936525"/>
+          </a:xfrm>
+        </p:spPr>
+        <p:txBody>
+          <a:bodyPr/>
+          <a:lstStyle/>
+          <a:p>
+            <a:pPr lvl="0">
+              <a:spcAft>
+                <a:spcPts val="800"/>
+              </a:spcAft>
+              <a:buClr>
+                <a:srgbClr val="525252"/>
+              </a:buClr>
+            </a:pPr>
+            <a:endParaRPr lang="en-US" dirty="0">
+              <a:solidFill>
+                <a:srgbClr val="525252"/>
+              </a:solidFill>
+            </a:endParaRPr>
+          </a:p>
+          <a:p>
+            <a:pPr lvl="0">
+              <a:buClr>
+                <a:srgbClr val="525252"/>
+              </a:buClr>
+            </a:pPr>
+            <a:endParaRPr lang="ru-RU" dirty="0">
+              <a:solidFill>
+                <a:srgbClr val="525252"/>
+              </a:solidFill>
+            </a:endParaRPr>
+          </a:p>
+          <a:p>
+            <a:endParaRPr lang="ru-RU" dirty="0"/>
+          </a:p>
+        </p:txBody>
+      </p:sp>
+      <p:sp>
+        <p:nvSpPr>
+          <p:cNvPr id="13" name="Текст 4"/>
+          <p:cNvSpPr txBox="1">
+            <a:spLocks/>
+          </p:cNvSpPr>
+          <p:nvPr/>
+        </p:nvSpPr>
+        <p:spPr>
+          <a:xfrm>
+            <a:off x="12255941" y="760788"/>
+            <a:ext cx="5320208" cy="2928860"/>
           </a:xfrm>
           <a:prstGeom prst="rect">
             <a:avLst/>
           </a:prstGeom>
+          <a:noFill/>
+          <a:ln>
+            <a:noFill/>
+          </a:ln>
         </p:spPr>
-      </p:pic>
+        <p:txBody>
+          <a:bodyPr lIns="91425" tIns="91425" rIns="91425" bIns="91425" anchor="t" anchorCtr="0"/>
+          <a:lstStyle>
+            <a:defPPr marR="0" algn="l" rtl="0">
+              <a:lnSpc>
+                <a:spcPct val="100000"/>
+              </a:lnSpc>
+              <a:spcBef>
+                <a:spcPts val="0"/>
+              </a:spcBef>
+              <a:spcAft>
+                <a:spcPts val="0"/>
+              </a:spcAft>
+            </a:defPPr>
+            <a:lvl1pPr marR="0" algn="l" rtl="0">
+              <a:lnSpc>
+                <a:spcPct val="100000"/>
+              </a:lnSpc>
+              <a:spcBef>
+                <a:spcPts val="0"/>
+              </a:spcBef>
+              <a:spcAft>
+                <a:spcPts val="1600"/>
+              </a:spcAft>
+              <a:buClr>
+                <a:schemeClr val="dk2"/>
+              </a:buClr>
+              <a:buSzPct val="100000"/>
+              <a:buNone/>
+              <a:defRPr sz="3200" b="0" i="0" u="none" strike="noStrike" cap="none" spc="-5" baseline="0" dirty="0">
+                <a:solidFill>
+                  <a:schemeClr val="dk2"/>
+                </a:solidFill>
+                <a:latin typeface="+mn-lt"/>
+                <a:ea typeface="Arial"/>
+                <a:cs typeface="Arial"/>
+                <a:sym typeface="Arial"/>
+              </a:defRPr>
+            </a:lvl1pPr>
+            <a:lvl2pPr marR="0" algn="l" rtl="0">
+              <a:lnSpc>
+                <a:spcPct val="115000"/>
+              </a:lnSpc>
+              <a:spcBef>
+                <a:spcPts val="0"/>
+              </a:spcBef>
+              <a:spcAft>
+                <a:spcPts val="1600"/>
+              </a:spcAft>
+              <a:buClr>
+                <a:schemeClr val="dk2"/>
+              </a:buClr>
+              <a:buNone/>
+              <a:defRPr sz="3733" b="0" i="0" u="none" strike="noStrike" cap="none" baseline="0">
+                <a:solidFill>
+                  <a:schemeClr val="dk2"/>
+                </a:solidFill>
+                <a:latin typeface="Arial"/>
+                <a:ea typeface="Arial"/>
+                <a:cs typeface="Arial"/>
+                <a:sym typeface="Arial"/>
+              </a:defRPr>
+            </a:lvl2pPr>
+            <a:lvl3pPr marR="0" algn="l" rtl="0">
+              <a:lnSpc>
+                <a:spcPct val="115000"/>
+              </a:lnSpc>
+              <a:spcBef>
+                <a:spcPts val="0"/>
+              </a:spcBef>
+              <a:spcAft>
+                <a:spcPts val="1600"/>
+              </a:spcAft>
+              <a:buClr>
+                <a:schemeClr val="dk2"/>
+              </a:buClr>
+              <a:buNone/>
+              <a:defRPr sz="3733" b="0" i="0" u="none" strike="noStrike" cap="none" baseline="0">
+                <a:solidFill>
+                  <a:schemeClr val="dk2"/>
+                </a:solidFill>
+                <a:latin typeface="Arial"/>
+                <a:ea typeface="Arial"/>
+                <a:cs typeface="Arial"/>
+                <a:sym typeface="Arial"/>
+              </a:defRPr>
+            </a:lvl3pPr>
+            <a:lvl4pPr marR="0" algn="l" rtl="0">
+              <a:lnSpc>
+                <a:spcPct val="115000"/>
+              </a:lnSpc>
+              <a:spcBef>
+                <a:spcPts val="0"/>
+              </a:spcBef>
+              <a:spcAft>
+                <a:spcPts val="1600"/>
+              </a:spcAft>
+              <a:buClr>
+                <a:schemeClr val="dk2"/>
+              </a:buClr>
+              <a:buNone/>
+              <a:defRPr sz="3733" b="0" i="0" u="none" strike="noStrike" cap="none" baseline="0">
+                <a:solidFill>
+                  <a:schemeClr val="dk2"/>
+                </a:solidFill>
+                <a:latin typeface="Arial"/>
+                <a:ea typeface="Arial"/>
+                <a:cs typeface="Arial"/>
+                <a:sym typeface="Arial"/>
+              </a:defRPr>
+            </a:lvl4pPr>
+            <a:lvl5pPr marR="0" algn="l" rtl="0">
+              <a:lnSpc>
+                <a:spcPct val="115000"/>
+              </a:lnSpc>
+              <a:spcBef>
+                <a:spcPts val="0"/>
+              </a:spcBef>
+              <a:spcAft>
+                <a:spcPts val="1600"/>
+              </a:spcAft>
+              <a:buClr>
+                <a:schemeClr val="dk2"/>
+              </a:buClr>
+              <a:buNone/>
+              <a:defRPr sz="3733" b="0" i="0" u="none" strike="noStrike" cap="none" baseline="0">
+                <a:solidFill>
+                  <a:schemeClr val="dk2"/>
+                </a:solidFill>
+                <a:latin typeface="Arial"/>
+                <a:ea typeface="Arial"/>
+                <a:cs typeface="Arial"/>
+                <a:sym typeface="Arial"/>
+              </a:defRPr>
+            </a:lvl5pPr>
+            <a:lvl6pPr marR="0" algn="l" rtl="0">
+              <a:lnSpc>
+                <a:spcPct val="115000"/>
+              </a:lnSpc>
+              <a:spcBef>
+                <a:spcPts val="0"/>
+              </a:spcBef>
+              <a:spcAft>
+                <a:spcPts val="1600"/>
+              </a:spcAft>
+              <a:buClr>
+                <a:schemeClr val="dk2"/>
+              </a:buClr>
+              <a:buNone/>
+              <a:defRPr sz="3733" b="0" i="0" u="none" strike="noStrike" cap="none" baseline="0">
+                <a:solidFill>
+                  <a:schemeClr val="dk2"/>
+                </a:solidFill>
+                <a:latin typeface="Arial"/>
+                <a:ea typeface="Arial"/>
+                <a:cs typeface="Arial"/>
+                <a:sym typeface="Arial"/>
+              </a:defRPr>
+            </a:lvl6pPr>
+            <a:lvl7pPr marR="0" algn="l" rtl="0">
+              <a:lnSpc>
+                <a:spcPct val="115000"/>
+              </a:lnSpc>
+              <a:spcBef>
+                <a:spcPts val="0"/>
+              </a:spcBef>
+              <a:spcAft>
+                <a:spcPts val="1600"/>
+              </a:spcAft>
+              <a:buClr>
+                <a:schemeClr val="dk2"/>
+              </a:buClr>
+              <a:buNone/>
+              <a:defRPr sz="3733" b="0" i="0" u="none" strike="noStrike" cap="none" baseline="0">
+                <a:solidFill>
+                  <a:schemeClr val="dk2"/>
+                </a:solidFill>
+                <a:latin typeface="Arial"/>
+                <a:ea typeface="Arial"/>
+                <a:cs typeface="Arial"/>
+                <a:sym typeface="Arial"/>
+              </a:defRPr>
+            </a:lvl7pPr>
+            <a:lvl8pPr marR="0" algn="l" rtl="0">
+              <a:lnSpc>
+                <a:spcPct val="115000"/>
+              </a:lnSpc>
+              <a:spcBef>
+                <a:spcPts val="0"/>
+              </a:spcBef>
+              <a:spcAft>
+                <a:spcPts val="1600"/>
+              </a:spcAft>
+              <a:buClr>
+                <a:schemeClr val="dk2"/>
+              </a:buClr>
+              <a:buNone/>
+              <a:defRPr sz="3733" b="0" i="0" u="none" strike="noStrike" cap="none" baseline="0">
+                <a:solidFill>
+                  <a:schemeClr val="dk2"/>
+                </a:solidFill>
+                <a:latin typeface="Arial"/>
+                <a:ea typeface="Arial"/>
+                <a:cs typeface="Arial"/>
+                <a:sym typeface="Arial"/>
+              </a:defRPr>
+            </a:lvl8pPr>
+            <a:lvl9pPr marR="0" algn="l" rtl="0">
+              <a:lnSpc>
+                <a:spcPct val="115000"/>
+              </a:lnSpc>
+              <a:spcBef>
+                <a:spcPts val="0"/>
+              </a:spcBef>
+              <a:spcAft>
+                <a:spcPts val="1600"/>
+              </a:spcAft>
+              <a:buClr>
+                <a:schemeClr val="dk2"/>
+              </a:buClr>
+              <a:buNone/>
+              <a:defRPr sz="3733" b="0" i="0" u="none" strike="noStrike" cap="none" baseline="0">
+                <a:solidFill>
+                  <a:schemeClr val="dk2"/>
+                </a:solidFill>
+                <a:latin typeface="Arial"/>
+                <a:ea typeface="Arial"/>
+                <a:cs typeface="Arial"/>
+                <a:sym typeface="Arial"/>
+              </a:defRPr>
+            </a:lvl9pPr>
+          </a:lstStyle>
+          <a:p>
+            <a:endParaRPr lang="ru-RU" dirty="0">
+              <a:solidFill>
+                <a:schemeClr val="bg1">
+                  <a:lumMod val="95000"/>
+                </a:schemeClr>
+              </a:solidFill>
+            </a:endParaRPr>
+          </a:p>
+        </p:txBody>
+      </p:sp>
+      <p:sp>
+        <p:nvSpPr>
+          <p:cNvPr id="25" name="Text Placeholder 24">
+            <a:extLst>
+              <a:ext uri="{FF2B5EF4-FFF2-40B4-BE49-F238E27FC236}">
+                <a16:creationId xmlns:a16="http://schemas.microsoft.com/office/drawing/2014/main" id="{59270C2B-F531-57F6-B66B-8630309E56F6}"/>
+              </a:ext>
+            </a:extLst>
+          </p:cNvPr>
+          <p:cNvSpPr>
+            <a:spLocks noGrp="1"/>
+          </p:cNvSpPr>
+          <p:nvPr>
+            <p:ph type="body" idx="15"/>
+          </p:nvPr>
+        </p:nvSpPr>
+        <p:spPr>
+          <a:xfrm>
+            <a:off x="2066809" y="2789548"/>
+            <a:ext cx="20378264" cy="8136904"/>
+          </a:xfrm>
+        </p:spPr>
+        <p:txBody>
+          <a:bodyPr/>
+          <a:lstStyle/>
+          <a:p>
+            <a:pPr algn="l"/>
+            <a:endParaRPr lang="ru-RU" b="1" dirty="0">
+              <a:solidFill>
+                <a:srgbClr val="525252"/>
+              </a:solidFill>
+              <a:latin typeface="Arial" panose="020B0604020202020204" pitchFamily="34" charset="0"/>
+              <a:cs typeface="Arial" panose="020B0604020202020204" pitchFamily="34" charset="0"/>
+            </a:endParaRPr>
+          </a:p>
+          <a:p>
+            <a:pPr algn="l"/>
+            <a:endParaRPr lang="ru-RU" sz="4400" b="1" dirty="0">
+              <a:solidFill>
+                <a:srgbClr val="525252"/>
+              </a:solidFill>
+              <a:latin typeface="Arial" panose="020B0604020202020204" pitchFamily="34" charset="0"/>
+              <a:cs typeface="Arial" panose="020B0604020202020204" pitchFamily="34" charset="0"/>
+            </a:endParaRPr>
+          </a:p>
+          <a:p>
+            <a:pPr marL="457200" indent="-457200" algn="l">
+              <a:buClr>
+                <a:srgbClr val="0072BC"/>
+              </a:buClr>
+              <a:buFont typeface="Arial" panose="020B0604020202020204" pitchFamily="34" charset="0"/>
+              <a:buChar char="•"/>
+            </a:pPr>
+            <a:r>
+              <a:rPr lang="ru-RU" sz="6000" b="0" i="0" u="none" strike="noStrike" dirty="0">
+                <a:solidFill>
+                  <a:srgbClr val="525252"/>
+                </a:solidFill>
+                <a:effectLst/>
+              </a:rPr>
+              <a:t>Расширение диалекта </a:t>
+            </a:r>
+            <a:r>
+              <a:rPr lang="en-US" sz="6000" b="0" i="0" u="none" strike="noStrike" dirty="0">
+                <a:solidFill>
+                  <a:srgbClr val="525252"/>
+                </a:solidFill>
+                <a:effectLst/>
+              </a:rPr>
+              <a:t>TensorFlow</a:t>
+            </a:r>
+            <a:r>
+              <a:rPr lang="ru-RU" sz="6000" b="0" i="0" u="none" strike="noStrike" dirty="0">
+                <a:solidFill>
+                  <a:srgbClr val="525252"/>
+                </a:solidFill>
+                <a:effectLst/>
+              </a:rPr>
+              <a:t>.</a:t>
+            </a:r>
+            <a:endParaRPr lang="en-US" sz="6000" b="0" i="0" u="none" strike="noStrike" dirty="0">
+              <a:solidFill>
+                <a:srgbClr val="525252"/>
+              </a:solidFill>
+              <a:effectLst/>
+            </a:endParaRPr>
+          </a:p>
+          <a:p>
+            <a:pPr algn="l">
+              <a:buClr>
+                <a:srgbClr val="0072BC"/>
+              </a:buClr>
+            </a:pPr>
+            <a:endParaRPr lang="ru-RU" sz="6000" b="0" i="0" u="none" strike="noStrike" dirty="0">
+              <a:solidFill>
+                <a:srgbClr val="525252"/>
+              </a:solidFill>
+              <a:effectLst/>
+            </a:endParaRPr>
+          </a:p>
+          <a:p>
+            <a:pPr marL="457200" indent="-457200">
+              <a:buClr>
+                <a:srgbClr val="0072BC"/>
+              </a:buClr>
+              <a:buFont typeface="Arial" panose="020B0604020202020204" pitchFamily="34" charset="0"/>
+              <a:buChar char="•"/>
+            </a:pPr>
+            <a:r>
+              <a:rPr lang="ru-RU" sz="6000" dirty="0">
+                <a:solidFill>
+                  <a:srgbClr val="525252"/>
+                </a:solidFill>
+                <a:latin typeface="+mn-lt"/>
+              </a:rPr>
+              <a:t>Универсальное представление данных профилировщика. </a:t>
+            </a:r>
+            <a:endParaRPr lang="en-US" sz="6000" dirty="0">
+              <a:solidFill>
+                <a:srgbClr val="525252"/>
+              </a:solidFill>
+              <a:latin typeface="+mn-lt"/>
+            </a:endParaRPr>
+          </a:p>
+          <a:p>
+            <a:pPr>
+              <a:buClr>
+                <a:srgbClr val="0072BC"/>
+              </a:buClr>
+            </a:pPr>
+            <a:endParaRPr lang="ru-RU" sz="6000" dirty="0">
+              <a:solidFill>
+                <a:srgbClr val="525252"/>
+              </a:solidFill>
+              <a:latin typeface="+mn-lt"/>
+            </a:endParaRPr>
+          </a:p>
+          <a:p>
+            <a:pPr marL="457200" indent="-457200">
+              <a:buClr>
+                <a:srgbClr val="0072BC"/>
+              </a:buClr>
+              <a:buFont typeface="Arial" panose="020B0604020202020204" pitchFamily="34" charset="0"/>
+              <a:buChar char="•"/>
+            </a:pPr>
+            <a:r>
+              <a:rPr lang="ru-RU" sz="6000" dirty="0">
+                <a:latin typeface="+mn-lt"/>
+              </a:rPr>
+              <a:t>Инструмент визуализации и анализа</a:t>
+            </a:r>
+            <a:r>
+              <a:rPr lang="en-US" sz="6000" dirty="0">
+                <a:latin typeface="+mn-lt"/>
+              </a:rPr>
+              <a:t>.</a:t>
+            </a:r>
+            <a:endParaRPr lang="ru-RU" sz="6000" dirty="0">
+              <a:latin typeface="+mn-lt"/>
+            </a:endParaRPr>
+          </a:p>
+          <a:p>
+            <a:endParaRPr lang="en-US" dirty="0"/>
+          </a:p>
+        </p:txBody>
+      </p:sp>
     </p:spTree>
     <p:extLst>
       <p:ext uri="{BB962C8B-B14F-4D97-AF65-F5344CB8AC3E}">
-        <p14:creationId xmlns:p14="http://schemas.microsoft.com/office/powerpoint/2010/main" val="990407735"/>
+        <p14:creationId xmlns:p14="http://schemas.microsoft.com/office/powerpoint/2010/main" val="1819217759"/>
       </p:ext>
     </p:extLst>
   </p:cSld>
@@ -10572,7 +10857,15 @@
           <a:p>
             <a:r>
               <a:rPr lang="ru" sz="9600" dirty="0"/>
-              <a:t>Пример результата прямого прохода</a:t>
+              <a:t>Подробное </a:t>
+            </a:r>
+            <a:r>
+              <a:rPr lang="ru-RU" sz="9600" dirty="0"/>
+              <a:t>обсуждение </a:t>
+            </a:r>
+            <a:r>
+              <a:rPr lang="ru" sz="9600" dirty="0"/>
+              <a:t>архитектуры</a:t>
             </a:r>
             <a:br>
               <a:rPr lang="ru" sz="2400" dirty="0"/>
@@ -10610,7 +10903,7 @@
           <p:cNvPr id="6" name="Text Placeholder 5">
             <a:extLst>
               <a:ext uri="{FF2B5EF4-FFF2-40B4-BE49-F238E27FC236}">
-                <a16:creationId xmlns:a16="http://schemas.microsoft.com/office/drawing/2014/main" id="{6F368A5F-86ED-9B89-5A26-457A7B09A2CB}"/>
+                <a16:creationId xmlns:a16="http://schemas.microsoft.com/office/drawing/2014/main" id="{A43C0079-07D8-7DBD-3741-E92760E3C216}"/>
               </a:ext>
             </a:extLst>
           </p:cNvPr>
@@ -10626,70 +10919,44 @@
           <a:bodyPr/>
           <a:lstStyle/>
           <a:p>
-            <a:r>
-              <a:rPr lang="ru-RU" dirty="0"/>
-              <a:t>- приложить скрины </a:t>
-            </a:r>
-            <a:r>
-              <a:rPr lang="en-US" dirty="0"/>
-              <a:t>.</a:t>
-            </a:r>
-            <a:r>
-              <a:rPr lang="en-US" dirty="0" err="1"/>
-              <a:t>yaml</a:t>
-            </a:r>
-            <a:r>
-              <a:rPr lang="en-US" dirty="0"/>
-              <a:t> </a:t>
-            </a:r>
-          </a:p>
-          <a:p>
-            <a:r>
-              <a:rPr lang="en-US" dirty="0"/>
-              <a:t>- </a:t>
-            </a:r>
-            <a:r>
-              <a:rPr lang="ru-RU" dirty="0"/>
-              <a:t>приложить граф </a:t>
-            </a:r>
-            <a:r>
-              <a:rPr lang="ru-RU" dirty="0" err="1"/>
-              <a:t>дампнутых</a:t>
-            </a:r>
-            <a:r>
-              <a:rPr lang="ru-RU" dirty="0"/>
-              <a:t> </a:t>
-            </a:r>
-            <a:r>
-              <a:rPr lang="ru-RU" dirty="0" err="1"/>
-              <a:t>анотаций</a:t>
-            </a:r>
-            <a:r>
-              <a:rPr lang="ru-RU" dirty="0"/>
-              <a:t> с выделением «узких мест»</a:t>
-            </a:r>
-            <a:endParaRPr lang="en-US" dirty="0"/>
-          </a:p>
-          <a:p>
-            <a:r>
-              <a:rPr lang="en-US" dirty="0"/>
-              <a:t>- </a:t>
-            </a:r>
-            <a:r>
-              <a:rPr lang="ru-RU" dirty="0"/>
-              <a:t>скрин реального аннотированного </a:t>
-            </a:r>
-            <a:r>
-              <a:rPr lang="en-US" dirty="0"/>
-              <a:t>IR</a:t>
-            </a:r>
+            <a:endParaRPr lang="en-US"/>
           </a:p>
         </p:txBody>
       </p:sp>
+      <p:pic>
+        <p:nvPicPr>
+          <p:cNvPr id="8" name="Picture 7">
+            <a:extLst>
+              <a:ext uri="{FF2B5EF4-FFF2-40B4-BE49-F238E27FC236}">
+                <a16:creationId xmlns:a16="http://schemas.microsoft.com/office/drawing/2014/main" id="{318CEED2-5A1C-E7BC-2945-FFCFECCD5B70}"/>
+              </a:ext>
+            </a:extLst>
+          </p:cNvPr>
+          <p:cNvPicPr>
+            <a:picLocks noChangeAspect="1"/>
+          </p:cNvPicPr>
+          <p:nvPr/>
+        </p:nvPicPr>
+        <p:blipFill>
+          <a:blip r:embed="rId2"/>
+          <a:stretch>
+            <a:fillRect/>
+          </a:stretch>
+        </p:blipFill>
+        <p:spPr>
+          <a:xfrm>
+            <a:off x="931333" y="5850360"/>
+            <a:ext cx="22610512" cy="4247011"/>
+          </a:xfrm>
+          <a:prstGeom prst="rect">
+            <a:avLst/>
+          </a:prstGeom>
+        </p:spPr>
+      </p:pic>
     </p:spTree>
     <p:extLst>
       <p:ext uri="{BB962C8B-B14F-4D97-AF65-F5344CB8AC3E}">
-        <p14:creationId xmlns:p14="http://schemas.microsoft.com/office/powerpoint/2010/main" val="2755376552"/>
+        <p14:creationId xmlns:p14="http://schemas.microsoft.com/office/powerpoint/2010/main" val="990407735"/>
       </p:ext>
     </p:extLst>
   </p:cSld>
@@ -10733,7 +11000,7 @@
           <a:p>
             <a:r>
               <a:rPr lang="ru-RU" sz="9600" dirty="0"/>
-              <a:t>Обсуждение результатов и дальнейшие шаги</a:t>
+              <a:t>Пример входной программы и результата прохода компиляции </a:t>
             </a:r>
             <a:br>
               <a:rPr lang="ru" sz="2400" dirty="0"/>
@@ -10787,6 +11054,160 @@
           <a:bodyPr/>
           <a:lstStyle/>
           <a:p>
+            <a:r>
+              <a:rPr lang="ru-RU" dirty="0"/>
+              <a:t>- скрин входной программы</a:t>
+            </a:r>
+          </a:p>
+          <a:p>
+            <a:r>
+              <a:rPr lang="ru-RU" dirty="0"/>
+              <a:t>- скрин унифицированного формата </a:t>
+            </a:r>
+          </a:p>
+          <a:p>
+            <a:r>
+              <a:rPr lang="ru-RU" dirty="0"/>
+              <a:t>- скрин графа анализа </a:t>
+            </a:r>
+          </a:p>
+          <a:p>
+            <a:r>
+              <a:rPr lang="ru-RU" dirty="0"/>
+              <a:t>- скрин аннотированного </a:t>
+            </a:r>
+            <a:r>
+              <a:rPr lang="en-US" dirty="0"/>
+              <a:t>IR </a:t>
+            </a:r>
+          </a:p>
+          <a:p>
+            <a:r>
+              <a:rPr lang="en-US" dirty="0"/>
+              <a:t>- </a:t>
+            </a:r>
+            <a:r>
+              <a:rPr lang="ru-RU" dirty="0"/>
+              <a:t>слова о </a:t>
+            </a:r>
+            <a:r>
+              <a:rPr lang="en-US" dirty="0"/>
+              <a:t>lowering </a:t>
+            </a:r>
+            <a:r>
+              <a:rPr lang="ru-RU" dirty="0"/>
+              <a:t>и сохранении аннотаций </a:t>
+            </a:r>
+            <a:endParaRPr lang="en-US" dirty="0"/>
+          </a:p>
+        </p:txBody>
+      </p:sp>
+    </p:spTree>
+    <p:extLst>
+      <p:ext uri="{BB962C8B-B14F-4D97-AF65-F5344CB8AC3E}">
+        <p14:creationId xmlns:p14="http://schemas.microsoft.com/office/powerpoint/2010/main" val="2755376552"/>
+      </p:ext>
+    </p:extLst>
+  </p:cSld>
+  <p:clrMapOvr>
+    <a:masterClrMapping/>
+  </p:clrMapOvr>
+</p:sld>
+</file>
+
+<file path=ppt/slides/slide8.xml><?xml version="1.0" encoding="utf-8"?>
+<p:sld xmlns:a="http://schemas.openxmlformats.org/drawingml/2006/main" xmlns:r="http://schemas.openxmlformats.org/officeDocument/2006/relationships" xmlns:p="http://schemas.openxmlformats.org/presentationml/2006/main">
+  <p:cSld>
+    <p:spTree>
+      <p:nvGrpSpPr>
+        <p:cNvPr id="1" name=""/>
+        <p:cNvGrpSpPr/>
+        <p:nvPr/>
+      </p:nvGrpSpPr>
+      <p:grpSpPr>
+        <a:xfrm>
+          <a:off x="0" y="0"/>
+          <a:ext cx="0" cy="0"/>
+          <a:chOff x="0" y="0"/>
+          <a:chExt cx="0" cy="0"/>
+        </a:xfrm>
+      </p:grpSpPr>
+      <p:sp>
+        <p:nvSpPr>
+          <p:cNvPr id="2" name="Заголовок 1"/>
+          <p:cNvSpPr>
+            <a:spLocks noGrp="1"/>
+          </p:cNvSpPr>
+          <p:nvPr>
+            <p:ph type="title"/>
+          </p:nvPr>
+        </p:nvSpPr>
+        <p:spPr/>
+        <p:txBody>
+          <a:bodyPr/>
+          <a:lstStyle/>
+          <a:p>
+            <a:r>
+              <a:rPr lang="ru-RU" sz="9600" dirty="0"/>
+              <a:t>Обсуждение результатов и дальнейшие шаги</a:t>
+            </a:r>
+            <a:br>
+              <a:rPr lang="ru" sz="2400" dirty="0"/>
+            </a:br>
+            <a:endParaRPr lang="ru-RU" dirty="0"/>
+          </a:p>
+        </p:txBody>
+      </p:sp>
+      <p:sp>
+        <p:nvSpPr>
+          <p:cNvPr id="4" name="Номер слайда 3"/>
+          <p:cNvSpPr>
+            <a:spLocks noGrp="1"/>
+          </p:cNvSpPr>
+          <p:nvPr>
+            <p:ph type="sldNum" idx="12"/>
+          </p:nvPr>
+        </p:nvSpPr>
+        <p:spPr/>
+        <p:txBody>
+          <a:bodyPr/>
+          <a:lstStyle/>
+          <a:p>
+            <a:fld id="{00000000-1234-1234-1234-123412341234}" type="slidenum">
+              <a:rPr lang="ru-RU" smtClean="0"/>
+              <a:pPr/>
+              <a:t>8</a:t>
+            </a:fld>
+            <a:endParaRPr lang="ru-RU" dirty="0"/>
+          </a:p>
+        </p:txBody>
+      </p:sp>
+      <p:sp>
+        <p:nvSpPr>
+          <p:cNvPr id="6" name="Text Placeholder 5">
+            <a:extLst>
+              <a:ext uri="{FF2B5EF4-FFF2-40B4-BE49-F238E27FC236}">
+                <a16:creationId xmlns:a16="http://schemas.microsoft.com/office/drawing/2014/main" id="{6F368A5F-86ED-9B89-5A26-457A7B09A2CB}"/>
+              </a:ext>
+            </a:extLst>
+          </p:cNvPr>
+          <p:cNvSpPr>
+            <a:spLocks noGrp="1"/>
+          </p:cNvSpPr>
+          <p:nvPr>
+            <p:ph type="body" idx="1"/>
+          </p:nvPr>
+        </p:nvSpPr>
+        <p:spPr>
+          <a:xfrm>
+            <a:off x="931332" y="3905250"/>
+            <a:ext cx="12468663" cy="8187399"/>
+          </a:xfrm>
+        </p:spPr>
+        <p:txBody>
+          <a:bodyPr/>
+          <a:lstStyle/>
+          <a:p>
             <a:pPr marL="0" marR="0">
               <a:spcBef>
                 <a:spcPts val="0"/>
@@ -10856,7 +11277,7 @@
                 <a:spcPts val="0"/>
               </a:spcAft>
             </a:pPr>
-            <a:endParaRPr lang="en-US" sz="1800" kern="100" dirty="0">
+            <a:endParaRPr lang="en-US" kern="100" dirty="0">
               <a:effectLst/>
               <a:latin typeface="Calibri" panose="020F0502020204030204" pitchFamily="34" charset="0"/>
               <a:ea typeface="Calibri" panose="020F0502020204030204" pitchFamily="34" charset="0"/>
@@ -10889,20 +11310,10 @@
                 <a:ea typeface="Times New Roman" panose="02020603050405020304" pitchFamily="18" charset="0"/>
                 <a:cs typeface="Times New Roman" panose="02020603050405020304" pitchFamily="18" charset="0"/>
               </a:rPr>
-              <a:t>Разработ</a:t>
+              <a:t>Используются </a:t>
             </a:r>
             <a:r>
-              <a:rPr lang="ru-RU" dirty="0">
-                <a:solidFill>
-                  <a:srgbClr val="525252"/>
-                </a:solidFill>
-                <a:ea typeface="Times New Roman" panose="02020603050405020304" pitchFamily="18" charset="0"/>
-                <a:cs typeface="Times New Roman" panose="02020603050405020304" pitchFamily="18" charset="0"/>
-              </a:rPr>
-              <a:t>ан расширяемый </a:t>
-            </a:r>
-            <a:r>
-              <a:rPr lang="ru-RU" kern="0" dirty="0">
+              <a:rPr lang="ru-RU" kern="0" dirty="0" err="1">
                 <a:solidFill>
                   <a:srgbClr val="525252"/>
                 </a:solidFill>
@@ -10910,10 +11321,10 @@
                 <a:ea typeface="Times New Roman" panose="02020603050405020304" pitchFamily="18" charset="0"/>
                 <a:cs typeface="Times New Roman" panose="02020603050405020304" pitchFamily="18" charset="0"/>
               </a:rPr>
-              <a:t>фреймворк для аннотирования </a:t>
+              <a:t>трейты</a:t>
             </a:r>
             <a:r>
-              <a:rPr lang="en-US" kern="0" dirty="0">
+              <a:rPr lang="ru-RU" kern="0" dirty="0">
                 <a:solidFill>
                   <a:srgbClr val="525252"/>
                 </a:solidFill>
@@ -10921,24 +11332,129 @@
                 <a:ea typeface="Times New Roman" panose="02020603050405020304" pitchFamily="18" charset="0"/>
                 <a:cs typeface="Times New Roman" panose="02020603050405020304" pitchFamily="18" charset="0"/>
               </a:rPr>
-              <a:t>MLIR</a:t>
+              <a:t> и интерфейсы операций для добавления аннотаций.</a:t>
             </a:r>
-            <a:r>
-              <a:rPr lang="ru-RU" kern="0" dirty="0">
-                <a:solidFill>
-                  <a:srgbClr val="525252"/>
-                </a:solidFill>
-                <a:effectLst/>
-                <a:ea typeface="Times New Roman" panose="02020603050405020304" pitchFamily="18" charset="0"/>
-                <a:cs typeface="Times New Roman" panose="02020603050405020304" pitchFamily="18" charset="0"/>
-              </a:rPr>
-              <a:t> на основе профиля исполнения</a:t>
-            </a:r>
-            <a:endParaRPr lang="en-US" kern="100" dirty="0">
+          </a:p>
+          <a:p>
+            <a:pPr marL="342900" marR="0" lvl="0" indent="-342900">
+              <a:spcBef>
+                <a:spcPts val="0"/>
+              </a:spcBef>
+              <a:spcAft>
+                <a:spcPts val="0"/>
+              </a:spcAft>
+              <a:buClr>
+                <a:srgbClr val="0072BC"/>
+              </a:buClr>
+              <a:buFont typeface="Symbol" pitchFamily="2" charset="2"/>
+              <a:buChar char=""/>
+              <a:tabLst>
+                <a:tab pos="457200" algn="l"/>
+              </a:tabLst>
+            </a:pPr>
+            <a:endParaRPr lang="ru-RU" kern="0" dirty="0">
               <a:solidFill>
                 <a:srgbClr val="525252"/>
               </a:solidFill>
               <a:effectLst/>
+              <a:ea typeface="Times New Roman" panose="02020603050405020304" pitchFamily="18" charset="0"/>
+              <a:cs typeface="Times New Roman" panose="02020603050405020304" pitchFamily="18" charset="0"/>
+            </a:endParaRPr>
+          </a:p>
+          <a:p>
+            <a:pPr marL="342900" marR="0" lvl="0" indent="-342900">
+              <a:spcBef>
+                <a:spcPts val="0"/>
+              </a:spcBef>
+              <a:spcAft>
+                <a:spcPts val="0"/>
+              </a:spcAft>
+              <a:buClr>
+                <a:srgbClr val="0072BC"/>
+              </a:buClr>
+              <a:buFont typeface="Symbol" pitchFamily="2" charset="2"/>
+              <a:buChar char=""/>
+              <a:tabLst>
+                <a:tab pos="457200" algn="l"/>
+              </a:tabLst>
+            </a:pPr>
+            <a:r>
+              <a:rPr lang="ru-RU" dirty="0">
+                <a:solidFill>
+                  <a:srgbClr val="525252"/>
+                </a:solidFill>
+                <a:ea typeface="Calibri" panose="020F0502020204030204" pitchFamily="34" charset="0"/>
+                <a:cs typeface="Times New Roman" panose="02020603050405020304" pitchFamily="18" charset="0"/>
+              </a:rPr>
+              <a:t>Получен унифицированный </a:t>
+            </a:r>
+            <a:r>
+              <a:rPr lang="en-US" dirty="0" err="1">
+                <a:solidFill>
+                  <a:srgbClr val="525252"/>
+                </a:solidFill>
+                <a:ea typeface="Calibri" panose="020F0502020204030204" pitchFamily="34" charset="0"/>
+                <a:cs typeface="Times New Roman" panose="02020603050405020304" pitchFamily="18" charset="0"/>
+              </a:rPr>
+              <a:t>json</a:t>
+            </a:r>
+            <a:r>
+              <a:rPr lang="en-US" dirty="0">
+                <a:solidFill>
+                  <a:srgbClr val="525252"/>
+                </a:solidFill>
+                <a:ea typeface="Calibri" panose="020F0502020204030204" pitchFamily="34" charset="0"/>
+                <a:cs typeface="Times New Roman" panose="02020603050405020304" pitchFamily="18" charset="0"/>
+              </a:rPr>
+              <a:t> </a:t>
+            </a:r>
+            <a:r>
+              <a:rPr lang="ru-RU" dirty="0">
+                <a:solidFill>
+                  <a:srgbClr val="525252"/>
+                </a:solidFill>
+                <a:ea typeface="Calibri" panose="020F0502020204030204" pitchFamily="34" charset="0"/>
+                <a:cs typeface="Times New Roman" panose="02020603050405020304" pitchFamily="18" charset="0"/>
+              </a:rPr>
+              <a:t>формат данных профилировщика</a:t>
+            </a:r>
+            <a:r>
+              <a:rPr lang="en-US" dirty="0">
+                <a:solidFill>
+                  <a:srgbClr val="525252"/>
+                </a:solidFill>
+                <a:ea typeface="Calibri" panose="020F0502020204030204" pitchFamily="34" charset="0"/>
+                <a:cs typeface="Times New Roman" panose="02020603050405020304" pitchFamily="18" charset="0"/>
+              </a:rPr>
+              <a:t>.</a:t>
+            </a:r>
+            <a:endParaRPr lang="ru-RU" dirty="0">
+              <a:solidFill>
+                <a:srgbClr val="525252"/>
+              </a:solidFill>
+              <a:ea typeface="Calibri" panose="020F0502020204030204" pitchFamily="34" charset="0"/>
+              <a:cs typeface="Times New Roman" panose="02020603050405020304" pitchFamily="18" charset="0"/>
+            </a:endParaRPr>
+          </a:p>
+          <a:p>
+            <a:pPr marR="0" lvl="0">
+              <a:spcBef>
+                <a:spcPts val="0"/>
+              </a:spcBef>
+              <a:spcAft>
+                <a:spcPts val="0"/>
+              </a:spcAft>
+              <a:buClr>
+                <a:srgbClr val="0072BC"/>
+              </a:buClr>
+              <a:tabLst>
+                <a:tab pos="457200" algn="l"/>
+              </a:tabLst>
+            </a:pPr>
+            <a:endParaRPr lang="en-US" dirty="0">
+              <a:solidFill>
+                <a:srgbClr val="525252"/>
+              </a:solidFill>
               <a:ea typeface="Calibri" panose="020F0502020204030204" pitchFamily="34" charset="0"/>
               <a:cs typeface="Times New Roman" panose="02020603050405020304" pitchFamily="18" charset="0"/>
             </a:endParaRPr>
@@ -10969,87 +11485,11 @@
                 <a:ea typeface="Times New Roman" panose="02020603050405020304" pitchFamily="18" charset="0"/>
                 <a:cs typeface="Times New Roman" panose="02020603050405020304" pitchFamily="18" charset="0"/>
               </a:rPr>
-              <a:t>Используется диалект</a:t>
+              <a:t>Разработан инструмент для визуального анализа.</a:t>
             </a:r>
-            <a:r>
-              <a:rPr lang="en-US" kern="0" dirty="0">
-                <a:solidFill>
-                  <a:srgbClr val="525252"/>
-                </a:solidFill>
-                <a:effectLst/>
-                <a:ea typeface="Times New Roman" panose="02020603050405020304" pitchFamily="18" charset="0"/>
-                <a:cs typeface="Times New Roman" panose="02020603050405020304" pitchFamily="18" charset="0"/>
-              </a:rPr>
-              <a:t> </a:t>
-            </a:r>
-            <a:r>
-              <a:rPr lang="en-US" kern="0" dirty="0" err="1">
-                <a:solidFill>
-                  <a:srgbClr val="525252"/>
-                </a:solidFill>
-                <a:effectLst/>
-                <a:ea typeface="Times New Roman" panose="02020603050405020304" pitchFamily="18" charset="0"/>
-                <a:cs typeface="Times New Roman" panose="02020603050405020304" pitchFamily="18" charset="0"/>
-              </a:rPr>
-              <a:t>annot</a:t>
-            </a:r>
-            <a:r>
-              <a:rPr lang="en-US" dirty="0">
-                <a:solidFill>
-                  <a:srgbClr val="525252"/>
-                </a:solidFill>
-                <a:ea typeface="Times New Roman" panose="02020603050405020304" pitchFamily="18" charset="0"/>
-                <a:cs typeface="Times New Roman" panose="02020603050405020304" pitchFamily="18" charset="0"/>
-              </a:rPr>
-              <a:t>.</a:t>
-            </a:r>
-            <a:r>
-              <a:rPr lang="en-US" kern="0" dirty="0">
-                <a:solidFill>
-                  <a:srgbClr val="525252"/>
-                </a:solidFill>
-                <a:effectLst/>
-                <a:ea typeface="Times New Roman" panose="02020603050405020304" pitchFamily="18" charset="0"/>
-                <a:cs typeface="Times New Roman" panose="02020603050405020304" pitchFamily="18" charset="0"/>
-              </a:rPr>
-              <a:t> </a:t>
-            </a:r>
-            <a:r>
-              <a:rPr lang="ru-RU" kern="0" dirty="0">
-                <a:solidFill>
-                  <a:srgbClr val="525252"/>
-                </a:solidFill>
-                <a:effectLst/>
-                <a:ea typeface="Times New Roman" panose="02020603050405020304" pitchFamily="18" charset="0"/>
-                <a:cs typeface="Times New Roman" panose="02020603050405020304" pitchFamily="18" charset="0"/>
-              </a:rPr>
-              <a:t>и </a:t>
-            </a:r>
-            <a:r>
-              <a:rPr lang="en-US" kern="0" dirty="0">
-                <a:solidFill>
-                  <a:srgbClr val="525252"/>
-                </a:solidFill>
-                <a:effectLst/>
-                <a:ea typeface="Times New Roman" panose="02020603050405020304" pitchFamily="18" charset="0"/>
-                <a:cs typeface="Times New Roman" panose="02020603050405020304" pitchFamily="18" charset="0"/>
-              </a:rPr>
-              <a:t>YAML</a:t>
-            </a:r>
-            <a:r>
-              <a:rPr lang="ru-RU" kern="0" dirty="0">
-                <a:solidFill>
-                  <a:srgbClr val="525252"/>
-                </a:solidFill>
-                <a:effectLst/>
-                <a:ea typeface="Times New Roman" panose="02020603050405020304" pitchFamily="18" charset="0"/>
-                <a:cs typeface="Times New Roman" panose="02020603050405020304" pitchFamily="18" charset="0"/>
-              </a:rPr>
-              <a:t>-схема для метаданных</a:t>
-            </a:r>
-          </a:p>
-          <a:p>
-            <a:pPr marL="342900" marR="0" lvl="0" indent="-342900">
+          </a:p>
+          <a:p>
+            <a:pPr marR="0" lvl="0">
               <a:spcBef>
                 <a:spcPts val="0"/>
               </a:spcBef>
@@ -11059,38 +11499,16 @@
               <a:buClr>
                 <a:srgbClr val="0072BC"/>
               </a:buClr>
-              <a:buFont typeface="Symbol" pitchFamily="2" charset="2"/>
-              <a:buChar char=""/>
               <a:tabLst>
                 <a:tab pos="457200" algn="l"/>
               </a:tabLst>
             </a:pPr>
-            <a:r>
-              <a:rPr lang="ru-RU" dirty="0">
-                <a:solidFill>
-                  <a:srgbClr val="525252"/>
-                </a:solidFill>
-                <a:ea typeface="Calibri" panose="020F0502020204030204" pitchFamily="34" charset="0"/>
-                <a:cs typeface="Times New Roman" panose="02020603050405020304" pitchFamily="18" charset="0"/>
-              </a:rPr>
-              <a:t>Протестирована работа на реальных трассах </a:t>
-            </a:r>
-            <a:r>
-              <a:rPr lang="en-US" dirty="0">
-                <a:solidFill>
-                  <a:srgbClr val="525252"/>
-                </a:solidFill>
-                <a:ea typeface="Calibri" panose="020F0502020204030204" pitchFamily="34" charset="0"/>
-                <a:cs typeface="Times New Roman" panose="02020603050405020304" pitchFamily="18" charset="0"/>
-              </a:rPr>
-              <a:t>TensorFlow</a:t>
-            </a:r>
-            <a:endParaRPr lang="en-US" kern="100" dirty="0">
+            <a:endParaRPr lang="en-US" kern="0" dirty="0">
               <a:solidFill>
                 <a:srgbClr val="525252"/>
               </a:solidFill>
               <a:effectLst/>
-              <a:ea typeface="Calibri" panose="020F0502020204030204" pitchFamily="34" charset="0"/>
+              <a:ea typeface="Times New Roman" panose="02020603050405020304" pitchFamily="18" charset="0"/>
               <a:cs typeface="Times New Roman" panose="02020603050405020304" pitchFamily="18" charset="0"/>
             </a:endParaRPr>
           </a:p>
@@ -11120,8 +11538,26 @@
                 <a:ea typeface="Times New Roman" panose="02020603050405020304" pitchFamily="18" charset="0"/>
                 <a:cs typeface="Times New Roman" panose="02020603050405020304" pitchFamily="18" charset="0"/>
               </a:rPr>
-              <a:t>Создаются проходы, отображающие потенциальные места для оптимизаций</a:t>
+              <a:t>Протестировано на реальных трассах </a:t>
             </a:r>
+            <a:r>
+              <a:rPr lang="en-US" dirty="0">
+                <a:solidFill>
+                  <a:srgbClr val="525252"/>
+                </a:solidFill>
+                <a:ea typeface="Times New Roman" panose="02020603050405020304" pitchFamily="18" charset="0"/>
+                <a:cs typeface="Times New Roman" panose="02020603050405020304" pitchFamily="18" charset="0"/>
+              </a:rPr>
+              <a:t>TensorFlow.</a:t>
+            </a:r>
+            <a:endParaRPr lang="ru-RU" kern="0" dirty="0">
+              <a:solidFill>
+                <a:srgbClr val="525252"/>
+              </a:solidFill>
+              <a:effectLst/>
+              <a:ea typeface="Times New Roman" panose="02020603050405020304" pitchFamily="18" charset="0"/>
+              <a:cs typeface="Times New Roman" panose="02020603050405020304" pitchFamily="18" charset="0"/>
+            </a:endParaRPr>
           </a:p>
           <a:p>
             <a:pPr marL="342900" marR="0" lvl="0" indent="-342900">
@@ -11191,8 +11627,8 @@
         </p:nvSpPr>
         <p:spPr>
           <a:xfrm>
-            <a:off x="13399996" y="4481736"/>
-            <a:ext cx="9505056" cy="4524315"/>
+            <a:off x="13395584" y="4265712"/>
+            <a:ext cx="9505056" cy="6986528"/>
           </a:xfrm>
           <a:prstGeom prst="rect">
             <a:avLst/>
@@ -11227,12 +11663,6 @@
             </a:r>
           </a:p>
           <a:p>
-            <a:endParaRPr lang="en-US" sz="3200" dirty="0">
-              <a:latin typeface="Arial" panose="020B0604020202020204" pitchFamily="34" charset="0"/>
-              <a:cs typeface="Arial" panose="020B0604020202020204" pitchFamily="34" charset="0"/>
-            </a:endParaRPr>
-          </a:p>
-          <a:p>
             <a:pPr marL="0" marR="0">
               <a:spcBef>
                 <a:spcPts val="0"/>
@@ -11267,7 +11697,7 @@
               </a:tabLst>
             </a:pPr>
             <a:r>
-              <a:rPr lang="en-US" sz="3200" kern="0" dirty="0" err="1">
+              <a:rPr lang="ru-RU" sz="3200" kern="0" dirty="0">
                 <a:solidFill>
                   <a:srgbClr val="525252"/>
                 </a:solidFill>
@@ -11276,7 +11706,7 @@
                 <a:ea typeface="Times New Roman" panose="02020603050405020304" pitchFamily="18" charset="0"/>
                 <a:cs typeface="Times New Roman" panose="02020603050405020304" pitchFamily="18" charset="0"/>
               </a:rPr>
-              <a:t>Разработка</a:t>
+              <a:t>Адаптирование решения для работы с данными профиля </a:t>
             </a:r>
             <a:r>
               <a:rPr lang="en-US" sz="3200" kern="0" dirty="0">
@@ -11288,21 +11718,37 @@
                 <a:ea typeface="Times New Roman" panose="02020603050405020304" pitchFamily="18" charset="0"/>
                 <a:cs typeface="Times New Roman" panose="02020603050405020304" pitchFamily="18" charset="0"/>
               </a:rPr>
-              <a:t> CLI-</a:t>
+              <a:t>NPU Ascent</a:t>
             </a:r>
             <a:r>
-              <a:rPr lang="en-US" sz="3200" kern="0" dirty="0" err="1">
+              <a:rPr lang="en-US" sz="3200" dirty="0">
                 <a:solidFill>
                   <a:srgbClr val="525252"/>
                 </a:solidFill>
-                <a:effectLst/>
                 <a:latin typeface="+mn-lt"/>
                 <a:ea typeface="Times New Roman" panose="02020603050405020304" pitchFamily="18" charset="0"/>
                 <a:cs typeface="Times New Roman" panose="02020603050405020304" pitchFamily="18" charset="0"/>
               </a:rPr>
-              <a:t>инструмента</a:t>
+              <a:t>.</a:t>
             </a:r>
-            <a:endParaRPr lang="ru-RU" sz="3200" kern="0" dirty="0">
+          </a:p>
+          <a:p>
+            <a:pPr marR="0" lvl="0">
+              <a:spcBef>
+                <a:spcPts val="0"/>
+              </a:spcBef>
+              <a:spcAft>
+                <a:spcPts val="0"/>
+              </a:spcAft>
+              <a:buClr>
+                <a:srgbClr val="0072BC"/>
+              </a:buClr>
+              <a:buSzPct val="100000"/>
+              <a:tabLst>
+                <a:tab pos="457200" algn="l"/>
+              </a:tabLst>
+            </a:pPr>
+            <a:endParaRPr lang="en-US" sz="3200" kern="0" dirty="0">
               <a:solidFill>
                 <a:srgbClr val="525252"/>
               </a:solidFill>
@@ -11339,8 +11785,143 @@
                 <a:ea typeface="Calibri" panose="020F0502020204030204" pitchFamily="34" charset="0"/>
                 <a:cs typeface="Times New Roman" panose="02020603050405020304" pitchFamily="18" charset="0"/>
               </a:rPr>
-              <a:t>Разработка оптимизаций на основе анализа</a:t>
+              <a:t>Разработка </a:t>
             </a:r>
+            <a:r>
+              <a:rPr lang="en-US" sz="3200" dirty="0">
+                <a:solidFill>
+                  <a:srgbClr val="525252"/>
+                </a:solidFill>
+                <a:latin typeface="+mn-lt"/>
+                <a:ea typeface="Calibri" panose="020F0502020204030204" pitchFamily="34" charset="0"/>
+                <a:cs typeface="Times New Roman" panose="02020603050405020304" pitchFamily="18" charset="0"/>
+              </a:rPr>
+              <a:t>CLI-</a:t>
+            </a:r>
+            <a:r>
+              <a:rPr lang="ru-RU" sz="3200" dirty="0">
+                <a:solidFill>
+                  <a:srgbClr val="525252"/>
+                </a:solidFill>
+                <a:latin typeface="+mn-lt"/>
+                <a:ea typeface="Calibri" panose="020F0502020204030204" pitchFamily="34" charset="0"/>
+                <a:cs typeface="Times New Roman" panose="02020603050405020304" pitchFamily="18" charset="0"/>
+              </a:rPr>
+              <a:t>инструмента</a:t>
+            </a:r>
+            <a:r>
+              <a:rPr lang="en-US" sz="3200" dirty="0">
+                <a:solidFill>
+                  <a:srgbClr val="525252"/>
+                </a:solidFill>
+                <a:latin typeface="+mn-lt"/>
+                <a:ea typeface="Calibri" panose="020F0502020204030204" pitchFamily="34" charset="0"/>
+                <a:cs typeface="Times New Roman" panose="02020603050405020304" pitchFamily="18" charset="0"/>
+              </a:rPr>
+              <a:t>.</a:t>
+            </a:r>
+            <a:endParaRPr lang="ru-RU" sz="3200" dirty="0">
+              <a:solidFill>
+                <a:srgbClr val="525252"/>
+              </a:solidFill>
+              <a:latin typeface="+mn-lt"/>
+              <a:ea typeface="Calibri" panose="020F0502020204030204" pitchFamily="34" charset="0"/>
+              <a:cs typeface="Times New Roman" panose="02020603050405020304" pitchFamily="18" charset="0"/>
+            </a:endParaRPr>
+          </a:p>
+          <a:p>
+            <a:pPr marR="0" lvl="0">
+              <a:spcBef>
+                <a:spcPts val="0"/>
+              </a:spcBef>
+              <a:spcAft>
+                <a:spcPts val="0"/>
+              </a:spcAft>
+              <a:buClr>
+                <a:srgbClr val="0072BC"/>
+              </a:buClr>
+              <a:buSzPct val="100000"/>
+              <a:tabLst>
+                <a:tab pos="457200" algn="l"/>
+              </a:tabLst>
+            </a:pPr>
+            <a:endParaRPr lang="ru-RU" sz="3200" dirty="0">
+              <a:solidFill>
+                <a:srgbClr val="525252"/>
+              </a:solidFill>
+              <a:latin typeface="+mn-lt"/>
+              <a:ea typeface="Calibri" panose="020F0502020204030204" pitchFamily="34" charset="0"/>
+              <a:cs typeface="Times New Roman" panose="02020603050405020304" pitchFamily="18" charset="0"/>
+            </a:endParaRPr>
+          </a:p>
+          <a:p>
+            <a:pPr marL="342900" marR="0" lvl="0" indent="-342900">
+              <a:spcBef>
+                <a:spcPts val="0"/>
+              </a:spcBef>
+              <a:spcAft>
+                <a:spcPts val="0"/>
+              </a:spcAft>
+              <a:buClr>
+                <a:srgbClr val="0072BC"/>
+              </a:buClr>
+              <a:buSzPct val="100000"/>
+              <a:buFont typeface="Symbol" pitchFamily="2" charset="2"/>
+              <a:buChar char=""/>
+              <a:tabLst>
+                <a:tab pos="457200" algn="l"/>
+              </a:tabLst>
+            </a:pPr>
+            <a:r>
+              <a:rPr lang="ru-RU" sz="3200" kern="100" dirty="0">
+                <a:solidFill>
+                  <a:srgbClr val="525252"/>
+                </a:solidFill>
+                <a:effectLst/>
+                <a:latin typeface="+mn-lt"/>
+                <a:ea typeface="Calibri" panose="020F0502020204030204" pitchFamily="34" charset="0"/>
+                <a:cs typeface="Times New Roman" panose="02020603050405020304" pitchFamily="18" charset="0"/>
+              </a:rPr>
+              <a:t>Разработка оптимизирующих проходов на основе добавленных данных профиля</a:t>
+            </a:r>
+            <a:r>
+              <a:rPr lang="en-US" sz="3200" kern="100" dirty="0">
+                <a:solidFill>
+                  <a:srgbClr val="525252"/>
+                </a:solidFill>
+                <a:effectLst/>
+                <a:latin typeface="+mn-lt"/>
+                <a:ea typeface="Calibri" panose="020F0502020204030204" pitchFamily="34" charset="0"/>
+                <a:cs typeface="Times New Roman" panose="02020603050405020304" pitchFamily="18" charset="0"/>
+              </a:rPr>
+              <a:t>.</a:t>
+            </a:r>
+            <a:endParaRPr lang="ru-RU" sz="3200" kern="100" dirty="0">
+              <a:solidFill>
+                <a:srgbClr val="525252"/>
+              </a:solidFill>
+              <a:effectLst/>
+              <a:latin typeface="+mn-lt"/>
+              <a:ea typeface="Calibri" panose="020F0502020204030204" pitchFamily="34" charset="0"/>
+              <a:cs typeface="Times New Roman" panose="02020603050405020304" pitchFamily="18" charset="0"/>
+            </a:endParaRPr>
+          </a:p>
+          <a:p>
+            <a:pPr marR="0" lvl="0">
+              <a:spcBef>
+                <a:spcPts val="0"/>
+              </a:spcBef>
+              <a:spcAft>
+                <a:spcPts val="0"/>
+              </a:spcAft>
+              <a:buClr>
+                <a:srgbClr val="0072BC"/>
+              </a:buClr>
+              <a:buSzPct val="100000"/>
+              <a:tabLst>
+                <a:tab pos="457200" algn="l"/>
+              </a:tabLst>
+            </a:pPr>
             <a:endParaRPr lang="en-US" sz="3200" kern="100" dirty="0">
               <a:solidFill>
                 <a:srgbClr val="525252"/>

</xml_diff>